<commit_message>
[#3] feat: add visual explanation to validate subsequence problem
</commit_message>
<xml_diff>
--- a/visualizations-of-algorithms-in-a-shell.pptx
+++ b/visualizations-of-algorithms-in-a-shell.pptx
@@ -6,6 +6,7 @@
   </p:sldMasterIdLst>
   <p:sldIdLst>
     <p:sldId id="256" r:id="rId2"/>
+    <p:sldId id="257" r:id="rId3"/>
   </p:sldIdLst>
   <p:sldSz cx="12192000" cy="6858000"/>
   <p:notesSz cx="6858000" cy="9144000"/>
@@ -104,6 +105,11 @@
       </a:defRPr>
     </a:lvl9pPr>
   </p:defaultTextStyle>
+  <p:extLst>
+    <p:ext uri="{EFAFB233-063F-42B5-8137-9DF3F51BA10A}">
+      <p15:sldGuideLst xmlns:p15="http://schemas.microsoft.com/office/powerpoint/2012/main"/>
+    </p:ext>
+  </p:extLst>
 </p:presentation>
 </file>
 
@@ -256,7 +262,7 @@
           <a:p>
             <a:fld id="{C118C255-7F94-3C4E-B992-01782D5FCAEE}" type="datetimeFigureOut">
               <a:rPr lang="en-TR" smtClean="0"/>
-              <a:t>12.02.2021</a:t>
+              <a:t>8.03.2021</a:t>
             </a:fld>
             <a:endParaRPr lang="en-TR"/>
           </a:p>
@@ -456,7 +462,7 @@
           <a:p>
             <a:fld id="{C118C255-7F94-3C4E-B992-01782D5FCAEE}" type="datetimeFigureOut">
               <a:rPr lang="en-TR" smtClean="0"/>
-              <a:t>12.02.2021</a:t>
+              <a:t>8.03.2021</a:t>
             </a:fld>
             <a:endParaRPr lang="en-TR"/>
           </a:p>
@@ -666,7 +672,7 @@
           <a:p>
             <a:fld id="{C118C255-7F94-3C4E-B992-01782D5FCAEE}" type="datetimeFigureOut">
               <a:rPr lang="en-TR" smtClean="0"/>
-              <a:t>12.02.2021</a:t>
+              <a:t>8.03.2021</a:t>
             </a:fld>
             <a:endParaRPr lang="en-TR"/>
           </a:p>
@@ -866,7 +872,7 @@
           <a:p>
             <a:fld id="{C118C255-7F94-3C4E-B992-01782D5FCAEE}" type="datetimeFigureOut">
               <a:rPr lang="en-TR" smtClean="0"/>
-              <a:t>12.02.2021</a:t>
+              <a:t>8.03.2021</a:t>
             </a:fld>
             <a:endParaRPr lang="en-TR"/>
           </a:p>
@@ -1142,7 +1148,7 @@
           <a:p>
             <a:fld id="{C118C255-7F94-3C4E-B992-01782D5FCAEE}" type="datetimeFigureOut">
               <a:rPr lang="en-TR" smtClean="0"/>
-              <a:t>12.02.2021</a:t>
+              <a:t>8.03.2021</a:t>
             </a:fld>
             <a:endParaRPr lang="en-TR"/>
           </a:p>
@@ -1410,7 +1416,7 @@
           <a:p>
             <a:fld id="{C118C255-7F94-3C4E-B992-01782D5FCAEE}" type="datetimeFigureOut">
               <a:rPr lang="en-TR" smtClean="0"/>
-              <a:t>12.02.2021</a:t>
+              <a:t>8.03.2021</a:t>
             </a:fld>
             <a:endParaRPr lang="en-TR"/>
           </a:p>
@@ -1825,7 +1831,7 @@
           <a:p>
             <a:fld id="{C118C255-7F94-3C4E-B992-01782D5FCAEE}" type="datetimeFigureOut">
               <a:rPr lang="en-TR" smtClean="0"/>
-              <a:t>12.02.2021</a:t>
+              <a:t>8.03.2021</a:t>
             </a:fld>
             <a:endParaRPr lang="en-TR"/>
           </a:p>
@@ -1967,7 +1973,7 @@
           <a:p>
             <a:fld id="{C118C255-7F94-3C4E-B992-01782D5FCAEE}" type="datetimeFigureOut">
               <a:rPr lang="en-TR" smtClean="0"/>
-              <a:t>12.02.2021</a:t>
+              <a:t>8.03.2021</a:t>
             </a:fld>
             <a:endParaRPr lang="en-TR"/>
           </a:p>
@@ -2080,7 +2086,7 @@
           <a:p>
             <a:fld id="{C118C255-7F94-3C4E-B992-01782D5FCAEE}" type="datetimeFigureOut">
               <a:rPr lang="en-TR" smtClean="0"/>
-              <a:t>12.02.2021</a:t>
+              <a:t>8.03.2021</a:t>
             </a:fld>
             <a:endParaRPr lang="en-TR"/>
           </a:p>
@@ -2393,7 +2399,7 @@
           <a:p>
             <a:fld id="{C118C255-7F94-3C4E-B992-01782D5FCAEE}" type="datetimeFigureOut">
               <a:rPr lang="en-TR" smtClean="0"/>
-              <a:t>12.02.2021</a:t>
+              <a:t>8.03.2021</a:t>
             </a:fld>
             <a:endParaRPr lang="en-TR"/>
           </a:p>
@@ -2682,7 +2688,7 @@
           <a:p>
             <a:fld id="{C118C255-7F94-3C4E-B992-01782D5FCAEE}" type="datetimeFigureOut">
               <a:rPr lang="en-TR" smtClean="0"/>
-              <a:t>12.02.2021</a:t>
+              <a:t>8.03.2021</a:t>
             </a:fld>
             <a:endParaRPr lang="en-TR"/>
           </a:p>
@@ -2925,7 +2931,7 @@
           <a:p>
             <a:fld id="{C118C255-7F94-3C4E-B992-01782D5FCAEE}" type="datetimeFigureOut">
               <a:rPr lang="en-TR" smtClean="0"/>
-              <a:t>12.02.2021</a:t>
+              <a:t>8.03.2021</a:t>
             </a:fld>
             <a:endParaRPr lang="en-TR"/>
           </a:p>
@@ -3983,7 +3989,7 @@
                   </a:schemeClr>
                 </a:solidFill>
               </a:rPr>
-              <a:t> in </a:t>
+              <a:t> of </a:t>
             </a:r>
             <a:r>
               <a:rPr lang="en-US" dirty="0">
@@ -6943,7 +6949,7 @@
                   </a:schemeClr>
                 </a:solidFill>
               </a:rPr>
-              <a:t> in </a:t>
+              <a:t> of </a:t>
             </a:r>
             <a:r>
               <a:rPr lang="en-US" dirty="0">
@@ -7082,7 +7088,7 @@
                   </a:schemeClr>
                 </a:solidFill>
               </a:rPr>
-              <a:t> in </a:t>
+              <a:t> of </a:t>
             </a:r>
             <a:r>
               <a:rPr lang="en-US" dirty="0">
@@ -7221,7 +7227,7 @@
                   </a:schemeClr>
                 </a:solidFill>
               </a:rPr>
-              <a:t> in </a:t>
+              <a:t> of </a:t>
             </a:r>
             <a:r>
               <a:rPr lang="en-US" dirty="0">
@@ -7360,7 +7366,7 @@
                   </a:schemeClr>
                 </a:solidFill>
               </a:rPr>
-              <a:t> in </a:t>
+              <a:t> of </a:t>
             </a:r>
             <a:r>
               <a:rPr lang="en-US" dirty="0">
@@ -7499,7 +7505,7 @@
                   </a:schemeClr>
                 </a:solidFill>
               </a:rPr>
-              <a:t> in </a:t>
+              <a:t> of </a:t>
             </a:r>
             <a:r>
               <a:rPr lang="en-US" dirty="0">
@@ -7638,7 +7644,7 @@
                   </a:schemeClr>
                 </a:solidFill>
               </a:rPr>
-              <a:t> in </a:t>
+              <a:t> of </a:t>
             </a:r>
             <a:r>
               <a:rPr lang="en-US" dirty="0">
@@ -8866,6 +8872,3073 @@
     <p:extLst>
       <p:ext uri="{BB962C8B-B14F-4D97-AF65-F5344CB8AC3E}">
         <p14:creationId xmlns:p14="http://schemas.microsoft.com/office/powerpoint/2010/main" val="426597729"/>
+      </p:ext>
+    </p:extLst>
+  </p:cSld>
+  <p:clrMapOvr>
+    <a:masterClrMapping/>
+  </p:clrMapOvr>
+</p:sld>
+</file>
+
+<file path=ppt/slides/slide2.xml><?xml version="1.0" encoding="utf-8"?>
+<p:sld xmlns:a="http://schemas.openxmlformats.org/drawingml/2006/main" xmlns:r="http://schemas.openxmlformats.org/officeDocument/2006/relationships" xmlns:p="http://schemas.openxmlformats.org/presentationml/2006/main">
+  <p:cSld>
+    <p:spTree>
+      <p:nvGrpSpPr>
+        <p:cNvPr id="1" name=""/>
+        <p:cNvGrpSpPr/>
+        <p:nvPr/>
+      </p:nvGrpSpPr>
+      <p:grpSpPr>
+        <a:xfrm>
+          <a:off x="0" y="0"/>
+          <a:ext cx="0" cy="0"/>
+          <a:chOff x="0" y="0"/>
+          <a:chExt cx="0" cy="0"/>
+        </a:xfrm>
+      </p:grpSpPr>
+      <p:sp>
+        <p:nvSpPr>
+          <p:cNvPr id="4" name="TextBox 3">
+            <a:extLst>
+              <a:ext uri="{FF2B5EF4-FFF2-40B4-BE49-F238E27FC236}">
+                <a16:creationId xmlns:a16="http://schemas.microsoft.com/office/drawing/2014/main" id="{925A9F32-F6BB-7141-B569-9D9C5F2FF1E2}"/>
+              </a:ext>
+            </a:extLst>
+          </p:cNvPr>
+          <p:cNvSpPr txBox="1"/>
+          <p:nvPr/>
+        </p:nvSpPr>
+        <p:spPr>
+          <a:xfrm>
+            <a:off x="4228640" y="-39995"/>
+            <a:ext cx="3203702" cy="646331"/>
+          </a:xfrm>
+          <a:prstGeom prst="rect">
+            <a:avLst/>
+          </a:prstGeom>
+          <a:noFill/>
+        </p:spPr>
+        <p:txBody>
+          <a:bodyPr wrap="square" rtlCol="0">
+            <a:spAutoFit/>
+          </a:bodyPr>
+          <a:lstStyle/>
+          <a:p>
+            <a:pPr algn="ctr"/>
+            <a:r>
+              <a:rPr lang="en-TR" b="1" dirty="0">
+                <a:solidFill>
+                  <a:schemeClr val="accent1">
+                    <a:lumMod val="75000"/>
+                  </a:schemeClr>
+                </a:solidFill>
+              </a:rPr>
+              <a:t>Validate Subsequence</a:t>
+            </a:r>
+          </a:p>
+          <a:p>
+            <a:pPr algn="ctr"/>
+            <a:r>
+              <a:rPr lang="en-TR" b="1" dirty="0">
+                <a:solidFill>
+                  <a:schemeClr val="accent1">
+                    <a:lumMod val="75000"/>
+                  </a:schemeClr>
+                </a:solidFill>
+              </a:rPr>
+              <a:t>Time: O(n) Space: O(1)</a:t>
+            </a:r>
+          </a:p>
+        </p:txBody>
+      </p:sp>
+      <p:sp>
+        <p:nvSpPr>
+          <p:cNvPr id="5" name="Rectangle 4">
+            <a:extLst>
+              <a:ext uri="{FF2B5EF4-FFF2-40B4-BE49-F238E27FC236}">
+                <a16:creationId xmlns:a16="http://schemas.microsoft.com/office/drawing/2014/main" id="{B634C935-8A37-5048-8250-DEB1C8AEC4B6}"/>
+              </a:ext>
+            </a:extLst>
+          </p:cNvPr>
+          <p:cNvSpPr/>
+          <p:nvPr/>
+        </p:nvSpPr>
+        <p:spPr>
+          <a:xfrm>
+            <a:off x="410577" y="1132495"/>
+            <a:ext cx="737616" cy="716280"/>
+          </a:xfrm>
+          <a:prstGeom prst="rect">
+            <a:avLst/>
+          </a:prstGeom>
+        </p:spPr>
+        <p:style>
+          <a:lnRef idx="3">
+            <a:schemeClr val="lt1"/>
+          </a:lnRef>
+          <a:fillRef idx="1">
+            <a:schemeClr val="accent5"/>
+          </a:fillRef>
+          <a:effectRef idx="1">
+            <a:schemeClr val="accent5"/>
+          </a:effectRef>
+          <a:fontRef idx="minor">
+            <a:schemeClr val="lt1"/>
+          </a:fontRef>
+        </p:style>
+        <p:txBody>
+          <a:bodyPr rtlCol="0" anchor="ctr"/>
+          <a:lstStyle/>
+          <a:p>
+            <a:pPr algn="ctr"/>
+            <a:r>
+              <a:rPr lang="en-TR" dirty="0"/>
+              <a:t>5</a:t>
+            </a:r>
+          </a:p>
+        </p:txBody>
+      </p:sp>
+      <p:sp>
+        <p:nvSpPr>
+          <p:cNvPr id="6" name="Rectangle 5">
+            <a:extLst>
+              <a:ext uri="{FF2B5EF4-FFF2-40B4-BE49-F238E27FC236}">
+                <a16:creationId xmlns:a16="http://schemas.microsoft.com/office/drawing/2014/main" id="{5856D484-C135-D141-96F8-1E41E3E36B48}"/>
+              </a:ext>
+            </a:extLst>
+          </p:cNvPr>
+          <p:cNvSpPr/>
+          <p:nvPr/>
+        </p:nvSpPr>
+        <p:spPr>
+          <a:xfrm>
+            <a:off x="410577" y="1848775"/>
+            <a:ext cx="737616" cy="716280"/>
+          </a:xfrm>
+          <a:prstGeom prst="rect">
+            <a:avLst/>
+          </a:prstGeom>
+          <a:solidFill>
+            <a:schemeClr val="accent2"/>
+          </a:solidFill>
+        </p:spPr>
+        <p:style>
+          <a:lnRef idx="3">
+            <a:schemeClr val="lt1"/>
+          </a:lnRef>
+          <a:fillRef idx="1">
+            <a:schemeClr val="accent5"/>
+          </a:fillRef>
+          <a:effectRef idx="1">
+            <a:schemeClr val="accent5"/>
+          </a:effectRef>
+          <a:fontRef idx="minor">
+            <a:schemeClr val="lt1"/>
+          </a:fontRef>
+        </p:style>
+        <p:txBody>
+          <a:bodyPr rtlCol="0" anchor="ctr"/>
+          <a:lstStyle/>
+          <a:p>
+            <a:pPr algn="ctr"/>
+            <a:r>
+              <a:rPr lang="en-TR" dirty="0"/>
+              <a:t>1</a:t>
+            </a:r>
+          </a:p>
+        </p:txBody>
+      </p:sp>
+      <p:sp>
+        <p:nvSpPr>
+          <p:cNvPr id="7" name="Rectangle 6">
+            <a:extLst>
+              <a:ext uri="{FF2B5EF4-FFF2-40B4-BE49-F238E27FC236}">
+                <a16:creationId xmlns:a16="http://schemas.microsoft.com/office/drawing/2014/main" id="{BD4BC7F2-0C27-0243-B325-569E02844DBC}"/>
+              </a:ext>
+            </a:extLst>
+          </p:cNvPr>
+          <p:cNvSpPr/>
+          <p:nvPr/>
+        </p:nvSpPr>
+        <p:spPr>
+          <a:xfrm>
+            <a:off x="410577" y="2565055"/>
+            <a:ext cx="743712" cy="716280"/>
+          </a:xfrm>
+          <a:prstGeom prst="rect">
+            <a:avLst/>
+          </a:prstGeom>
+        </p:spPr>
+        <p:style>
+          <a:lnRef idx="3">
+            <a:schemeClr val="lt1"/>
+          </a:lnRef>
+          <a:fillRef idx="1">
+            <a:schemeClr val="accent5"/>
+          </a:fillRef>
+          <a:effectRef idx="1">
+            <a:schemeClr val="accent5"/>
+          </a:effectRef>
+          <a:fontRef idx="minor">
+            <a:schemeClr val="lt1"/>
+          </a:fontRef>
+        </p:style>
+        <p:txBody>
+          <a:bodyPr rtlCol="0" anchor="ctr"/>
+          <a:lstStyle/>
+          <a:p>
+            <a:pPr algn="ctr"/>
+            <a:r>
+              <a:rPr lang="en-TR" dirty="0"/>
+              <a:t>22</a:t>
+            </a:r>
+          </a:p>
+        </p:txBody>
+      </p:sp>
+      <p:sp>
+        <p:nvSpPr>
+          <p:cNvPr id="8" name="Rectangle 7">
+            <a:extLst>
+              <a:ext uri="{FF2B5EF4-FFF2-40B4-BE49-F238E27FC236}">
+                <a16:creationId xmlns:a16="http://schemas.microsoft.com/office/drawing/2014/main" id="{E159C781-2B4C-C640-B34E-785CDB184CC9}"/>
+              </a:ext>
+            </a:extLst>
+          </p:cNvPr>
+          <p:cNvSpPr/>
+          <p:nvPr/>
+        </p:nvSpPr>
+        <p:spPr>
+          <a:xfrm>
+            <a:off x="410577" y="3281335"/>
+            <a:ext cx="749808" cy="716280"/>
+          </a:xfrm>
+          <a:prstGeom prst="rect">
+            <a:avLst/>
+          </a:prstGeom>
+        </p:spPr>
+        <p:style>
+          <a:lnRef idx="3">
+            <a:schemeClr val="lt1"/>
+          </a:lnRef>
+          <a:fillRef idx="1">
+            <a:schemeClr val="accent5"/>
+          </a:fillRef>
+          <a:effectRef idx="1">
+            <a:schemeClr val="accent5"/>
+          </a:effectRef>
+          <a:fontRef idx="minor">
+            <a:schemeClr val="lt1"/>
+          </a:fontRef>
+        </p:style>
+        <p:txBody>
+          <a:bodyPr rtlCol="0" anchor="ctr"/>
+          <a:lstStyle/>
+          <a:p>
+            <a:pPr algn="ctr"/>
+            <a:r>
+              <a:rPr lang="en-TR" dirty="0"/>
+              <a:t>25</a:t>
+            </a:r>
+          </a:p>
+        </p:txBody>
+      </p:sp>
+      <p:sp>
+        <p:nvSpPr>
+          <p:cNvPr id="9" name="Rectangle 8">
+            <a:extLst>
+              <a:ext uri="{FF2B5EF4-FFF2-40B4-BE49-F238E27FC236}">
+                <a16:creationId xmlns:a16="http://schemas.microsoft.com/office/drawing/2014/main" id="{3BD55629-C06E-AB43-B54E-C2D38F0B0FD1}"/>
+              </a:ext>
+            </a:extLst>
+          </p:cNvPr>
+          <p:cNvSpPr/>
+          <p:nvPr/>
+        </p:nvSpPr>
+        <p:spPr>
+          <a:xfrm>
+            <a:off x="410577" y="3997615"/>
+            <a:ext cx="749808" cy="716280"/>
+          </a:xfrm>
+          <a:prstGeom prst="rect">
+            <a:avLst/>
+          </a:prstGeom>
+          <a:solidFill>
+            <a:schemeClr val="accent2"/>
+          </a:solidFill>
+        </p:spPr>
+        <p:style>
+          <a:lnRef idx="3">
+            <a:schemeClr val="lt1"/>
+          </a:lnRef>
+          <a:fillRef idx="1">
+            <a:schemeClr val="accent5"/>
+          </a:fillRef>
+          <a:effectRef idx="1">
+            <a:schemeClr val="accent5"/>
+          </a:effectRef>
+          <a:fontRef idx="minor">
+            <a:schemeClr val="lt1"/>
+          </a:fontRef>
+        </p:style>
+        <p:txBody>
+          <a:bodyPr rtlCol="0" anchor="ctr"/>
+          <a:lstStyle/>
+          <a:p>
+            <a:pPr algn="ctr"/>
+            <a:r>
+              <a:rPr lang="en-TR" dirty="0"/>
+              <a:t>6</a:t>
+            </a:r>
+          </a:p>
+        </p:txBody>
+      </p:sp>
+      <p:sp>
+        <p:nvSpPr>
+          <p:cNvPr id="10" name="Rectangle 9">
+            <a:extLst>
+              <a:ext uri="{FF2B5EF4-FFF2-40B4-BE49-F238E27FC236}">
+                <a16:creationId xmlns:a16="http://schemas.microsoft.com/office/drawing/2014/main" id="{7FDCAACC-0C31-2944-9BEB-16613D9A54B1}"/>
+              </a:ext>
+            </a:extLst>
+          </p:cNvPr>
+          <p:cNvSpPr/>
+          <p:nvPr/>
+        </p:nvSpPr>
+        <p:spPr>
+          <a:xfrm>
+            <a:off x="410577" y="4713895"/>
+            <a:ext cx="749808" cy="716280"/>
+          </a:xfrm>
+          <a:prstGeom prst="rect">
+            <a:avLst/>
+          </a:prstGeom>
+          <a:solidFill>
+            <a:schemeClr val="accent2"/>
+          </a:solidFill>
+        </p:spPr>
+        <p:style>
+          <a:lnRef idx="3">
+            <a:schemeClr val="lt1"/>
+          </a:lnRef>
+          <a:fillRef idx="1">
+            <a:schemeClr val="accent5"/>
+          </a:fillRef>
+          <a:effectRef idx="1">
+            <a:schemeClr val="accent5"/>
+          </a:effectRef>
+          <a:fontRef idx="minor">
+            <a:schemeClr val="lt1"/>
+          </a:fontRef>
+        </p:style>
+        <p:txBody>
+          <a:bodyPr rtlCol="0" anchor="ctr"/>
+          <a:lstStyle/>
+          <a:p>
+            <a:pPr algn="ctr"/>
+            <a:r>
+              <a:rPr lang="en-TR" dirty="0"/>
+              <a:t>-1</a:t>
+            </a:r>
+          </a:p>
+        </p:txBody>
+      </p:sp>
+      <p:sp>
+        <p:nvSpPr>
+          <p:cNvPr id="11" name="Rectangle 10">
+            <a:extLst>
+              <a:ext uri="{FF2B5EF4-FFF2-40B4-BE49-F238E27FC236}">
+                <a16:creationId xmlns:a16="http://schemas.microsoft.com/office/drawing/2014/main" id="{8D9A2BC7-8996-474C-A3D9-A8C857B9D83A}"/>
+              </a:ext>
+            </a:extLst>
+          </p:cNvPr>
+          <p:cNvSpPr/>
+          <p:nvPr/>
+        </p:nvSpPr>
+        <p:spPr>
+          <a:xfrm>
+            <a:off x="410577" y="5434747"/>
+            <a:ext cx="749808" cy="716280"/>
+          </a:xfrm>
+          <a:prstGeom prst="rect">
+            <a:avLst/>
+          </a:prstGeom>
+        </p:spPr>
+        <p:style>
+          <a:lnRef idx="3">
+            <a:schemeClr val="lt1"/>
+          </a:lnRef>
+          <a:fillRef idx="1">
+            <a:schemeClr val="accent5"/>
+          </a:fillRef>
+          <a:effectRef idx="1">
+            <a:schemeClr val="accent5"/>
+          </a:effectRef>
+          <a:fontRef idx="minor">
+            <a:schemeClr val="lt1"/>
+          </a:fontRef>
+        </p:style>
+        <p:txBody>
+          <a:bodyPr rtlCol="0" anchor="ctr"/>
+          <a:lstStyle/>
+          <a:p>
+            <a:pPr algn="ctr"/>
+            <a:r>
+              <a:rPr lang="en-TR" dirty="0"/>
+              <a:t>8</a:t>
+            </a:r>
+          </a:p>
+        </p:txBody>
+      </p:sp>
+      <p:sp>
+        <p:nvSpPr>
+          <p:cNvPr id="13" name="TextBox 12">
+            <a:extLst>
+              <a:ext uri="{FF2B5EF4-FFF2-40B4-BE49-F238E27FC236}">
+                <a16:creationId xmlns:a16="http://schemas.microsoft.com/office/drawing/2014/main" id="{009AC13D-5275-5244-9466-CA86D719457A}"/>
+              </a:ext>
+            </a:extLst>
+          </p:cNvPr>
+          <p:cNvSpPr txBox="1"/>
+          <p:nvPr/>
+        </p:nvSpPr>
+        <p:spPr>
+          <a:xfrm>
+            <a:off x="280065" y="683722"/>
+            <a:ext cx="999744" cy="369332"/>
+          </a:xfrm>
+          <a:prstGeom prst="rect">
+            <a:avLst/>
+          </a:prstGeom>
+          <a:noFill/>
+        </p:spPr>
+        <p:txBody>
+          <a:bodyPr wrap="square" rtlCol="0">
+            <a:spAutoFit/>
+          </a:bodyPr>
+          <a:lstStyle/>
+          <a:p>
+            <a:pPr algn="ctr"/>
+            <a:r>
+              <a:rPr lang="en-TR" dirty="0">
+                <a:solidFill>
+                  <a:schemeClr val="accent2">
+                    <a:lumMod val="75000"/>
+                  </a:schemeClr>
+                </a:solidFill>
+                <a:highlight>
+                  <a:srgbClr val="00FF00"/>
+                </a:highlight>
+              </a:rPr>
+              <a:t>array</a:t>
+            </a:r>
+          </a:p>
+        </p:txBody>
+      </p:sp>
+      <p:sp>
+        <p:nvSpPr>
+          <p:cNvPr id="16" name="TextBox 15">
+            <a:extLst>
+              <a:ext uri="{FF2B5EF4-FFF2-40B4-BE49-F238E27FC236}">
+                <a16:creationId xmlns:a16="http://schemas.microsoft.com/office/drawing/2014/main" id="{51441653-F9C7-CF41-8907-CB9AA613561D}"/>
+              </a:ext>
+            </a:extLst>
+          </p:cNvPr>
+          <p:cNvSpPr txBox="1"/>
+          <p:nvPr/>
+        </p:nvSpPr>
+        <p:spPr>
+          <a:xfrm>
+            <a:off x="7253121" y="1370358"/>
+            <a:ext cx="1465472" cy="369332"/>
+          </a:xfrm>
+          <a:prstGeom prst="rect">
+            <a:avLst/>
+          </a:prstGeom>
+          <a:noFill/>
+        </p:spPr>
+        <p:txBody>
+          <a:bodyPr wrap="square" rtlCol="0">
+            <a:spAutoFit/>
+          </a:bodyPr>
+          <a:lstStyle/>
+          <a:p>
+            <a:pPr algn="ctr"/>
+            <a:r>
+              <a:rPr lang="en-TR" dirty="0">
+                <a:solidFill>
+                  <a:schemeClr val="accent2">
+                    <a:lumMod val="75000"/>
+                  </a:schemeClr>
+                </a:solidFill>
+                <a:highlight>
+                  <a:srgbClr val="00FF00"/>
+                </a:highlight>
+              </a:rPr>
+              <a:t>subsequence</a:t>
+            </a:r>
+          </a:p>
+        </p:txBody>
+      </p:sp>
+      <p:sp>
+        <p:nvSpPr>
+          <p:cNvPr id="17" name="TextBox 16">
+            <a:extLst>
+              <a:ext uri="{FF2B5EF4-FFF2-40B4-BE49-F238E27FC236}">
+                <a16:creationId xmlns:a16="http://schemas.microsoft.com/office/drawing/2014/main" id="{63D929EC-E146-B040-AC3D-AC54A91CBADB}"/>
+              </a:ext>
+            </a:extLst>
+          </p:cNvPr>
+          <p:cNvSpPr txBox="1"/>
+          <p:nvPr/>
+        </p:nvSpPr>
+        <p:spPr>
+          <a:xfrm>
+            <a:off x="272135" y="462240"/>
+            <a:ext cx="1165704" cy="253916"/>
+          </a:xfrm>
+          <a:prstGeom prst="rect">
+            <a:avLst/>
+          </a:prstGeom>
+          <a:noFill/>
+        </p:spPr>
+        <p:txBody>
+          <a:bodyPr wrap="none" rtlCol="0">
+            <a:spAutoFit/>
+          </a:bodyPr>
+          <a:lstStyle/>
+          <a:p>
+            <a:pPr algn="ctr"/>
+            <a:r>
+              <a:rPr lang="en-US" sz="1050" dirty="0"/>
+              <a:t>(P</a:t>
+            </a:r>
+            <a:r>
+              <a:rPr lang="en-TR" sz="1050" dirty="0"/>
+              <a:t>arameter given)</a:t>
+            </a:r>
+          </a:p>
+        </p:txBody>
+      </p:sp>
+      <p:sp>
+        <p:nvSpPr>
+          <p:cNvPr id="18" name="TextBox 17">
+            <a:extLst>
+              <a:ext uri="{FF2B5EF4-FFF2-40B4-BE49-F238E27FC236}">
+                <a16:creationId xmlns:a16="http://schemas.microsoft.com/office/drawing/2014/main" id="{01772C72-C91D-F643-8395-76455CEB5110}"/>
+              </a:ext>
+            </a:extLst>
+          </p:cNvPr>
+          <p:cNvSpPr txBox="1"/>
+          <p:nvPr/>
+        </p:nvSpPr>
+        <p:spPr>
+          <a:xfrm>
+            <a:off x="7403005" y="1158346"/>
+            <a:ext cx="1165704" cy="253916"/>
+          </a:xfrm>
+          <a:prstGeom prst="rect">
+            <a:avLst/>
+          </a:prstGeom>
+          <a:noFill/>
+        </p:spPr>
+        <p:txBody>
+          <a:bodyPr wrap="none" rtlCol="0">
+            <a:spAutoFit/>
+          </a:bodyPr>
+          <a:lstStyle/>
+          <a:p>
+            <a:pPr algn="ctr"/>
+            <a:r>
+              <a:rPr lang="en-US" sz="1050" dirty="0"/>
+              <a:t>(P</a:t>
+            </a:r>
+            <a:r>
+              <a:rPr lang="en-TR" sz="1050" dirty="0"/>
+              <a:t>arameter given)</a:t>
+            </a:r>
+          </a:p>
+        </p:txBody>
+      </p:sp>
+      <p:sp>
+        <p:nvSpPr>
+          <p:cNvPr id="20" name="Rectangle 19">
+            <a:extLst>
+              <a:ext uri="{FF2B5EF4-FFF2-40B4-BE49-F238E27FC236}">
+                <a16:creationId xmlns:a16="http://schemas.microsoft.com/office/drawing/2014/main" id="{CBD09D85-2C4A-B441-86E6-0863F3AA5818}"/>
+              </a:ext>
+            </a:extLst>
+          </p:cNvPr>
+          <p:cNvSpPr/>
+          <p:nvPr/>
+        </p:nvSpPr>
+        <p:spPr>
+          <a:xfrm>
+            <a:off x="7465827" y="1803446"/>
+            <a:ext cx="999744" cy="716280"/>
+          </a:xfrm>
+          <a:prstGeom prst="rect">
+            <a:avLst/>
+          </a:prstGeom>
+          <a:solidFill>
+            <a:srgbClr val="FFC000"/>
+          </a:solidFill>
+        </p:spPr>
+        <p:style>
+          <a:lnRef idx="3">
+            <a:schemeClr val="lt1"/>
+          </a:lnRef>
+          <a:fillRef idx="1">
+            <a:schemeClr val="accent4"/>
+          </a:fillRef>
+          <a:effectRef idx="1">
+            <a:schemeClr val="accent4"/>
+          </a:effectRef>
+          <a:fontRef idx="minor">
+            <a:schemeClr val="lt1"/>
+          </a:fontRef>
+        </p:style>
+        <p:txBody>
+          <a:bodyPr rtlCol="0" anchor="ctr"/>
+          <a:lstStyle/>
+          <a:p>
+            <a:pPr algn="ctr"/>
+            <a:r>
+              <a:rPr lang="en-TR" dirty="0"/>
+              <a:t>1</a:t>
+            </a:r>
+          </a:p>
+        </p:txBody>
+      </p:sp>
+      <p:sp>
+        <p:nvSpPr>
+          <p:cNvPr id="23" name="Rectangle 22">
+            <a:extLst>
+              <a:ext uri="{FF2B5EF4-FFF2-40B4-BE49-F238E27FC236}">
+                <a16:creationId xmlns:a16="http://schemas.microsoft.com/office/drawing/2014/main" id="{AC4A7364-086F-2D4E-9C36-1D133FA403A7}"/>
+              </a:ext>
+            </a:extLst>
+          </p:cNvPr>
+          <p:cNvSpPr/>
+          <p:nvPr/>
+        </p:nvSpPr>
+        <p:spPr>
+          <a:xfrm>
+            <a:off x="7465827" y="3243528"/>
+            <a:ext cx="999744" cy="716280"/>
+          </a:xfrm>
+          <a:prstGeom prst="rect">
+            <a:avLst/>
+          </a:prstGeom>
+          <a:solidFill>
+            <a:srgbClr val="FFC000"/>
+          </a:solidFill>
+        </p:spPr>
+        <p:style>
+          <a:lnRef idx="3">
+            <a:schemeClr val="lt1"/>
+          </a:lnRef>
+          <a:fillRef idx="1">
+            <a:schemeClr val="accent4"/>
+          </a:fillRef>
+          <a:effectRef idx="1">
+            <a:schemeClr val="accent4"/>
+          </a:effectRef>
+          <a:fontRef idx="minor">
+            <a:schemeClr val="lt1"/>
+          </a:fontRef>
+        </p:style>
+        <p:txBody>
+          <a:bodyPr rtlCol="0" anchor="ctr"/>
+          <a:lstStyle/>
+          <a:p>
+            <a:pPr algn="ctr"/>
+            <a:r>
+              <a:rPr lang="en-TR" dirty="0"/>
+              <a:t>-1</a:t>
+            </a:r>
+          </a:p>
+        </p:txBody>
+      </p:sp>
+      <p:sp>
+        <p:nvSpPr>
+          <p:cNvPr id="24" name="Rectangle 23">
+            <a:extLst>
+              <a:ext uri="{FF2B5EF4-FFF2-40B4-BE49-F238E27FC236}">
+                <a16:creationId xmlns:a16="http://schemas.microsoft.com/office/drawing/2014/main" id="{0F95C601-5EC5-DE42-BB35-613E554796E0}"/>
+              </a:ext>
+            </a:extLst>
+          </p:cNvPr>
+          <p:cNvSpPr/>
+          <p:nvPr/>
+        </p:nvSpPr>
+        <p:spPr>
+          <a:xfrm>
+            <a:off x="7465827" y="3966754"/>
+            <a:ext cx="999744" cy="716280"/>
+          </a:xfrm>
+          <a:prstGeom prst="rect">
+            <a:avLst/>
+          </a:prstGeom>
+          <a:solidFill>
+            <a:srgbClr val="FFC000"/>
+          </a:solidFill>
+        </p:spPr>
+        <p:style>
+          <a:lnRef idx="3">
+            <a:schemeClr val="lt1"/>
+          </a:lnRef>
+          <a:fillRef idx="1">
+            <a:schemeClr val="accent4"/>
+          </a:fillRef>
+          <a:effectRef idx="1">
+            <a:schemeClr val="accent4"/>
+          </a:effectRef>
+          <a:fontRef idx="minor">
+            <a:schemeClr val="lt1"/>
+          </a:fontRef>
+        </p:style>
+        <p:txBody>
+          <a:bodyPr rtlCol="0" anchor="ctr"/>
+          <a:lstStyle/>
+          <a:p>
+            <a:pPr algn="ctr"/>
+            <a:r>
+              <a:rPr lang="en-TR" dirty="0"/>
+              <a:t>10</a:t>
+            </a:r>
+          </a:p>
+        </p:txBody>
+      </p:sp>
+      <p:cxnSp>
+        <p:nvCxnSpPr>
+          <p:cNvPr id="25" name="Straight Arrow Connector 24">
+            <a:extLst>
+              <a:ext uri="{FF2B5EF4-FFF2-40B4-BE49-F238E27FC236}">
+                <a16:creationId xmlns:a16="http://schemas.microsoft.com/office/drawing/2014/main" id="{BCAD2516-17FA-6244-B997-67C52667374B}"/>
+              </a:ext>
+            </a:extLst>
+          </p:cNvPr>
+          <p:cNvCxnSpPr>
+            <a:cxnSpLocks/>
+          </p:cNvCxnSpPr>
+          <p:nvPr/>
+        </p:nvCxnSpPr>
+        <p:spPr>
+          <a:xfrm flipV="1">
+            <a:off x="1202687" y="1511134"/>
+            <a:ext cx="2452956" cy="5786"/>
+          </a:xfrm>
+          <a:prstGeom prst="straightConnector1">
+            <a:avLst/>
+          </a:prstGeom>
+          <a:ln w="38100">
+            <a:solidFill>
+              <a:schemeClr val="tx2"/>
+            </a:solidFill>
+            <a:tailEnd type="triangle"/>
+          </a:ln>
+        </p:spPr>
+        <p:style>
+          <a:lnRef idx="1">
+            <a:schemeClr val="accent1"/>
+          </a:lnRef>
+          <a:fillRef idx="0">
+            <a:schemeClr val="accent1"/>
+          </a:fillRef>
+          <a:effectRef idx="0">
+            <a:schemeClr val="accent1"/>
+          </a:effectRef>
+          <a:fontRef idx="minor">
+            <a:schemeClr val="tx1"/>
+          </a:fontRef>
+        </p:style>
+      </p:cxnSp>
+      <p:sp>
+        <p:nvSpPr>
+          <p:cNvPr id="26" name="TextBox 25">
+            <a:extLst>
+              <a:ext uri="{FF2B5EF4-FFF2-40B4-BE49-F238E27FC236}">
+                <a16:creationId xmlns:a16="http://schemas.microsoft.com/office/drawing/2014/main" id="{581F4E2F-6BC2-2640-946E-75C26E4862BA}"/>
+              </a:ext>
+            </a:extLst>
+          </p:cNvPr>
+          <p:cNvSpPr txBox="1"/>
+          <p:nvPr/>
+        </p:nvSpPr>
+        <p:spPr>
+          <a:xfrm>
+            <a:off x="1034363" y="1141802"/>
+            <a:ext cx="2621280" cy="369332"/>
+          </a:xfrm>
+          <a:prstGeom prst="rect">
+            <a:avLst/>
+          </a:prstGeom>
+          <a:noFill/>
+        </p:spPr>
+        <p:txBody>
+          <a:bodyPr wrap="square" rtlCol="0">
+            <a:spAutoFit/>
+          </a:bodyPr>
+          <a:lstStyle/>
+          <a:p>
+            <a:pPr algn="ctr"/>
+            <a:r>
+              <a:rPr lang="en-US" dirty="0">
+                <a:solidFill>
+                  <a:schemeClr val="accent2">
+                    <a:lumMod val="75000"/>
+                  </a:schemeClr>
+                </a:solidFill>
+              </a:rPr>
+              <a:t>for (const </a:t>
+            </a:r>
+            <a:r>
+              <a:rPr lang="en-US" dirty="0">
+                <a:solidFill>
+                  <a:schemeClr val="accent2">
+                    <a:lumMod val="75000"/>
+                  </a:schemeClr>
+                </a:solidFill>
+                <a:highlight>
+                  <a:srgbClr val="FFFF00"/>
+                </a:highlight>
+              </a:rPr>
+              <a:t>value</a:t>
+            </a:r>
+            <a:r>
+              <a:rPr lang="en-US" dirty="0">
+                <a:solidFill>
+                  <a:schemeClr val="accent2">
+                    <a:lumMod val="75000"/>
+                  </a:schemeClr>
+                </a:solidFill>
+              </a:rPr>
+              <a:t> of </a:t>
+            </a:r>
+            <a:r>
+              <a:rPr lang="en-US" dirty="0">
+                <a:solidFill>
+                  <a:schemeClr val="accent2">
+                    <a:lumMod val="75000"/>
+                  </a:schemeClr>
+                </a:solidFill>
+                <a:highlight>
+                  <a:srgbClr val="00FF00"/>
+                </a:highlight>
+              </a:rPr>
+              <a:t>array</a:t>
+            </a:r>
+            <a:r>
+              <a:rPr lang="en-US" dirty="0">
+                <a:solidFill>
+                  <a:schemeClr val="accent2">
+                    <a:lumMod val="75000"/>
+                  </a:schemeClr>
+                </a:solidFill>
+              </a:rPr>
+              <a:t>)</a:t>
+            </a:r>
+            <a:endParaRPr lang="en-TR" dirty="0">
+              <a:solidFill>
+                <a:schemeClr val="accent2">
+                  <a:lumMod val="75000"/>
+                </a:schemeClr>
+              </a:solidFill>
+            </a:endParaRPr>
+          </a:p>
+        </p:txBody>
+      </p:sp>
+      <p:cxnSp>
+        <p:nvCxnSpPr>
+          <p:cNvPr id="27" name="Straight Arrow Connector 26">
+            <a:extLst>
+              <a:ext uri="{FF2B5EF4-FFF2-40B4-BE49-F238E27FC236}">
+                <a16:creationId xmlns:a16="http://schemas.microsoft.com/office/drawing/2014/main" id="{BBC528A0-74E6-2B47-BA69-B9A12845A53C}"/>
+              </a:ext>
+            </a:extLst>
+          </p:cNvPr>
+          <p:cNvCxnSpPr>
+            <a:cxnSpLocks/>
+          </p:cNvCxnSpPr>
+          <p:nvPr/>
+        </p:nvCxnSpPr>
+        <p:spPr>
+          <a:xfrm flipV="1">
+            <a:off x="1202687" y="3022596"/>
+            <a:ext cx="2452956" cy="5786"/>
+          </a:xfrm>
+          <a:prstGeom prst="straightConnector1">
+            <a:avLst/>
+          </a:prstGeom>
+          <a:ln w="38100">
+            <a:solidFill>
+              <a:schemeClr val="tx2"/>
+            </a:solidFill>
+            <a:tailEnd type="triangle"/>
+          </a:ln>
+        </p:spPr>
+        <p:style>
+          <a:lnRef idx="1">
+            <a:schemeClr val="accent1"/>
+          </a:lnRef>
+          <a:fillRef idx="0">
+            <a:schemeClr val="accent1"/>
+          </a:fillRef>
+          <a:effectRef idx="0">
+            <a:schemeClr val="accent1"/>
+          </a:effectRef>
+          <a:fontRef idx="minor">
+            <a:schemeClr val="tx1"/>
+          </a:fontRef>
+        </p:style>
+      </p:cxnSp>
+      <p:sp>
+        <p:nvSpPr>
+          <p:cNvPr id="28" name="TextBox 27">
+            <a:extLst>
+              <a:ext uri="{FF2B5EF4-FFF2-40B4-BE49-F238E27FC236}">
+                <a16:creationId xmlns:a16="http://schemas.microsoft.com/office/drawing/2014/main" id="{B012C913-12F5-3E43-A277-73030D4F5089}"/>
+              </a:ext>
+            </a:extLst>
+          </p:cNvPr>
+          <p:cNvSpPr txBox="1"/>
+          <p:nvPr/>
+        </p:nvSpPr>
+        <p:spPr>
+          <a:xfrm>
+            <a:off x="1034363" y="2653264"/>
+            <a:ext cx="2621280" cy="369332"/>
+          </a:xfrm>
+          <a:prstGeom prst="rect">
+            <a:avLst/>
+          </a:prstGeom>
+          <a:noFill/>
+        </p:spPr>
+        <p:txBody>
+          <a:bodyPr wrap="square" rtlCol="0">
+            <a:spAutoFit/>
+          </a:bodyPr>
+          <a:lstStyle/>
+          <a:p>
+            <a:pPr algn="ctr"/>
+            <a:r>
+              <a:rPr lang="en-US" dirty="0">
+                <a:solidFill>
+                  <a:schemeClr val="accent2">
+                    <a:lumMod val="75000"/>
+                  </a:schemeClr>
+                </a:solidFill>
+              </a:rPr>
+              <a:t>for (const </a:t>
+            </a:r>
+            <a:r>
+              <a:rPr lang="en-US" dirty="0">
+                <a:solidFill>
+                  <a:schemeClr val="accent2">
+                    <a:lumMod val="75000"/>
+                  </a:schemeClr>
+                </a:solidFill>
+                <a:highlight>
+                  <a:srgbClr val="FFFF00"/>
+                </a:highlight>
+              </a:rPr>
+              <a:t>value</a:t>
+            </a:r>
+            <a:r>
+              <a:rPr lang="en-US" dirty="0">
+                <a:solidFill>
+                  <a:schemeClr val="accent2">
+                    <a:lumMod val="75000"/>
+                  </a:schemeClr>
+                </a:solidFill>
+              </a:rPr>
+              <a:t> of </a:t>
+            </a:r>
+            <a:r>
+              <a:rPr lang="en-US" dirty="0">
+                <a:solidFill>
+                  <a:schemeClr val="accent2">
+                    <a:lumMod val="75000"/>
+                  </a:schemeClr>
+                </a:solidFill>
+                <a:highlight>
+                  <a:srgbClr val="00FF00"/>
+                </a:highlight>
+              </a:rPr>
+              <a:t>array</a:t>
+            </a:r>
+            <a:r>
+              <a:rPr lang="en-US" dirty="0">
+                <a:solidFill>
+                  <a:schemeClr val="accent2">
+                    <a:lumMod val="75000"/>
+                  </a:schemeClr>
+                </a:solidFill>
+              </a:rPr>
+              <a:t>)</a:t>
+            </a:r>
+            <a:endParaRPr lang="en-TR" dirty="0">
+              <a:solidFill>
+                <a:schemeClr val="accent2">
+                  <a:lumMod val="75000"/>
+                </a:schemeClr>
+              </a:solidFill>
+            </a:endParaRPr>
+          </a:p>
+        </p:txBody>
+      </p:sp>
+      <p:cxnSp>
+        <p:nvCxnSpPr>
+          <p:cNvPr id="29" name="Straight Arrow Connector 28">
+            <a:extLst>
+              <a:ext uri="{FF2B5EF4-FFF2-40B4-BE49-F238E27FC236}">
+                <a16:creationId xmlns:a16="http://schemas.microsoft.com/office/drawing/2014/main" id="{129623F2-4E95-4E41-A136-15CA005B2F9B}"/>
+              </a:ext>
+            </a:extLst>
+          </p:cNvPr>
+          <p:cNvCxnSpPr>
+            <a:cxnSpLocks/>
+          </p:cNvCxnSpPr>
+          <p:nvPr/>
+        </p:nvCxnSpPr>
+        <p:spPr>
+          <a:xfrm flipV="1">
+            <a:off x="1202687" y="3691878"/>
+            <a:ext cx="2452956" cy="5786"/>
+          </a:xfrm>
+          <a:prstGeom prst="straightConnector1">
+            <a:avLst/>
+          </a:prstGeom>
+          <a:ln w="38100">
+            <a:solidFill>
+              <a:schemeClr val="tx2"/>
+            </a:solidFill>
+            <a:tailEnd type="triangle"/>
+          </a:ln>
+        </p:spPr>
+        <p:style>
+          <a:lnRef idx="1">
+            <a:schemeClr val="accent1"/>
+          </a:lnRef>
+          <a:fillRef idx="0">
+            <a:schemeClr val="accent1"/>
+          </a:fillRef>
+          <a:effectRef idx="0">
+            <a:schemeClr val="accent1"/>
+          </a:effectRef>
+          <a:fontRef idx="minor">
+            <a:schemeClr val="tx1"/>
+          </a:fontRef>
+        </p:style>
+      </p:cxnSp>
+      <p:sp>
+        <p:nvSpPr>
+          <p:cNvPr id="30" name="TextBox 29">
+            <a:extLst>
+              <a:ext uri="{FF2B5EF4-FFF2-40B4-BE49-F238E27FC236}">
+                <a16:creationId xmlns:a16="http://schemas.microsoft.com/office/drawing/2014/main" id="{44C627D6-4030-2141-9A2A-F4E4878AE81A}"/>
+              </a:ext>
+            </a:extLst>
+          </p:cNvPr>
+          <p:cNvSpPr txBox="1"/>
+          <p:nvPr/>
+        </p:nvSpPr>
+        <p:spPr>
+          <a:xfrm>
+            <a:off x="1034363" y="3322546"/>
+            <a:ext cx="2621280" cy="369332"/>
+          </a:xfrm>
+          <a:prstGeom prst="rect">
+            <a:avLst/>
+          </a:prstGeom>
+          <a:noFill/>
+        </p:spPr>
+        <p:txBody>
+          <a:bodyPr wrap="square" rtlCol="0">
+            <a:spAutoFit/>
+          </a:bodyPr>
+          <a:lstStyle/>
+          <a:p>
+            <a:pPr algn="ctr"/>
+            <a:r>
+              <a:rPr lang="en-US" dirty="0">
+                <a:solidFill>
+                  <a:schemeClr val="accent2">
+                    <a:lumMod val="75000"/>
+                  </a:schemeClr>
+                </a:solidFill>
+              </a:rPr>
+              <a:t>for (const </a:t>
+            </a:r>
+            <a:r>
+              <a:rPr lang="en-US" dirty="0">
+                <a:solidFill>
+                  <a:schemeClr val="accent2">
+                    <a:lumMod val="75000"/>
+                  </a:schemeClr>
+                </a:solidFill>
+                <a:highlight>
+                  <a:srgbClr val="FFFF00"/>
+                </a:highlight>
+              </a:rPr>
+              <a:t>value</a:t>
+            </a:r>
+            <a:r>
+              <a:rPr lang="en-US" dirty="0">
+                <a:solidFill>
+                  <a:schemeClr val="accent2">
+                    <a:lumMod val="75000"/>
+                  </a:schemeClr>
+                </a:solidFill>
+              </a:rPr>
+              <a:t> of </a:t>
+            </a:r>
+            <a:r>
+              <a:rPr lang="en-US" dirty="0">
+                <a:solidFill>
+                  <a:schemeClr val="accent2">
+                    <a:lumMod val="75000"/>
+                  </a:schemeClr>
+                </a:solidFill>
+                <a:highlight>
+                  <a:srgbClr val="00FF00"/>
+                </a:highlight>
+              </a:rPr>
+              <a:t>array)</a:t>
+            </a:r>
+            <a:endParaRPr lang="en-TR" dirty="0">
+              <a:solidFill>
+                <a:schemeClr val="accent2">
+                  <a:lumMod val="75000"/>
+                </a:schemeClr>
+              </a:solidFill>
+            </a:endParaRPr>
+          </a:p>
+        </p:txBody>
+      </p:sp>
+      <p:cxnSp>
+        <p:nvCxnSpPr>
+          <p:cNvPr id="31" name="Straight Arrow Connector 30">
+            <a:extLst>
+              <a:ext uri="{FF2B5EF4-FFF2-40B4-BE49-F238E27FC236}">
+                <a16:creationId xmlns:a16="http://schemas.microsoft.com/office/drawing/2014/main" id="{5A67B2A5-16EE-814E-BA4D-151E6AF69B73}"/>
+              </a:ext>
+            </a:extLst>
+          </p:cNvPr>
+          <p:cNvCxnSpPr>
+            <a:cxnSpLocks/>
+          </p:cNvCxnSpPr>
+          <p:nvPr/>
+        </p:nvCxnSpPr>
+        <p:spPr>
+          <a:xfrm flipV="1">
+            <a:off x="1202687" y="4415875"/>
+            <a:ext cx="2452956" cy="5786"/>
+          </a:xfrm>
+          <a:prstGeom prst="straightConnector1">
+            <a:avLst/>
+          </a:prstGeom>
+          <a:ln w="38100">
+            <a:solidFill>
+              <a:schemeClr val="tx2"/>
+            </a:solidFill>
+            <a:tailEnd type="triangle"/>
+          </a:ln>
+        </p:spPr>
+        <p:style>
+          <a:lnRef idx="1">
+            <a:schemeClr val="accent1"/>
+          </a:lnRef>
+          <a:fillRef idx="0">
+            <a:schemeClr val="accent1"/>
+          </a:fillRef>
+          <a:effectRef idx="0">
+            <a:schemeClr val="accent1"/>
+          </a:effectRef>
+          <a:fontRef idx="minor">
+            <a:schemeClr val="tx1"/>
+          </a:fontRef>
+        </p:style>
+      </p:cxnSp>
+      <p:sp>
+        <p:nvSpPr>
+          <p:cNvPr id="32" name="TextBox 31">
+            <a:extLst>
+              <a:ext uri="{FF2B5EF4-FFF2-40B4-BE49-F238E27FC236}">
+                <a16:creationId xmlns:a16="http://schemas.microsoft.com/office/drawing/2014/main" id="{EBD39271-B428-4D4B-BE49-0B9DB2890E5B}"/>
+              </a:ext>
+            </a:extLst>
+          </p:cNvPr>
+          <p:cNvSpPr txBox="1"/>
+          <p:nvPr/>
+        </p:nvSpPr>
+        <p:spPr>
+          <a:xfrm>
+            <a:off x="1034363" y="4046543"/>
+            <a:ext cx="2621280" cy="369332"/>
+          </a:xfrm>
+          <a:prstGeom prst="rect">
+            <a:avLst/>
+          </a:prstGeom>
+          <a:noFill/>
+        </p:spPr>
+        <p:txBody>
+          <a:bodyPr wrap="square" rtlCol="0">
+            <a:spAutoFit/>
+          </a:bodyPr>
+          <a:lstStyle/>
+          <a:p>
+            <a:pPr algn="ctr"/>
+            <a:r>
+              <a:rPr lang="en-US" dirty="0">
+                <a:solidFill>
+                  <a:schemeClr val="accent2">
+                    <a:lumMod val="75000"/>
+                  </a:schemeClr>
+                </a:solidFill>
+              </a:rPr>
+              <a:t>for (const </a:t>
+            </a:r>
+            <a:r>
+              <a:rPr lang="en-US" dirty="0">
+                <a:solidFill>
+                  <a:schemeClr val="accent2">
+                    <a:lumMod val="75000"/>
+                  </a:schemeClr>
+                </a:solidFill>
+                <a:highlight>
+                  <a:srgbClr val="FFFF00"/>
+                </a:highlight>
+              </a:rPr>
+              <a:t>value</a:t>
+            </a:r>
+            <a:r>
+              <a:rPr lang="en-US" dirty="0">
+                <a:solidFill>
+                  <a:schemeClr val="accent2">
+                    <a:lumMod val="75000"/>
+                  </a:schemeClr>
+                </a:solidFill>
+              </a:rPr>
+              <a:t> of </a:t>
+            </a:r>
+            <a:r>
+              <a:rPr lang="en-US" dirty="0">
+                <a:solidFill>
+                  <a:schemeClr val="accent2">
+                    <a:lumMod val="75000"/>
+                  </a:schemeClr>
+                </a:solidFill>
+                <a:highlight>
+                  <a:srgbClr val="00FF00"/>
+                </a:highlight>
+              </a:rPr>
+              <a:t>array</a:t>
+            </a:r>
+            <a:r>
+              <a:rPr lang="en-US" dirty="0">
+                <a:solidFill>
+                  <a:schemeClr val="accent2">
+                    <a:lumMod val="75000"/>
+                  </a:schemeClr>
+                </a:solidFill>
+              </a:rPr>
+              <a:t>)</a:t>
+            </a:r>
+            <a:endParaRPr lang="en-TR" dirty="0">
+              <a:solidFill>
+                <a:schemeClr val="accent2">
+                  <a:lumMod val="75000"/>
+                </a:schemeClr>
+              </a:solidFill>
+            </a:endParaRPr>
+          </a:p>
+        </p:txBody>
+      </p:sp>
+      <p:cxnSp>
+        <p:nvCxnSpPr>
+          <p:cNvPr id="33" name="Straight Arrow Connector 32">
+            <a:extLst>
+              <a:ext uri="{FF2B5EF4-FFF2-40B4-BE49-F238E27FC236}">
+                <a16:creationId xmlns:a16="http://schemas.microsoft.com/office/drawing/2014/main" id="{887D3219-9DF5-8646-B296-3722DF675E00}"/>
+              </a:ext>
+            </a:extLst>
+          </p:cNvPr>
+          <p:cNvCxnSpPr>
+            <a:cxnSpLocks/>
+          </p:cNvCxnSpPr>
+          <p:nvPr/>
+        </p:nvCxnSpPr>
+        <p:spPr>
+          <a:xfrm flipV="1">
+            <a:off x="1202687" y="5119703"/>
+            <a:ext cx="2452956" cy="5786"/>
+          </a:xfrm>
+          <a:prstGeom prst="straightConnector1">
+            <a:avLst/>
+          </a:prstGeom>
+          <a:ln w="38100">
+            <a:solidFill>
+              <a:schemeClr val="tx2"/>
+            </a:solidFill>
+            <a:tailEnd type="triangle"/>
+          </a:ln>
+        </p:spPr>
+        <p:style>
+          <a:lnRef idx="1">
+            <a:schemeClr val="accent1"/>
+          </a:lnRef>
+          <a:fillRef idx="0">
+            <a:schemeClr val="accent1"/>
+          </a:fillRef>
+          <a:effectRef idx="0">
+            <a:schemeClr val="accent1"/>
+          </a:effectRef>
+          <a:fontRef idx="minor">
+            <a:schemeClr val="tx1"/>
+          </a:fontRef>
+        </p:style>
+      </p:cxnSp>
+      <p:sp>
+        <p:nvSpPr>
+          <p:cNvPr id="34" name="TextBox 33">
+            <a:extLst>
+              <a:ext uri="{FF2B5EF4-FFF2-40B4-BE49-F238E27FC236}">
+                <a16:creationId xmlns:a16="http://schemas.microsoft.com/office/drawing/2014/main" id="{E83E4857-3726-6E45-84B1-5201629217D1}"/>
+              </a:ext>
+            </a:extLst>
+          </p:cNvPr>
+          <p:cNvSpPr txBox="1"/>
+          <p:nvPr/>
+        </p:nvSpPr>
+        <p:spPr>
+          <a:xfrm>
+            <a:off x="1034363" y="4750371"/>
+            <a:ext cx="2621280" cy="369332"/>
+          </a:xfrm>
+          <a:prstGeom prst="rect">
+            <a:avLst/>
+          </a:prstGeom>
+          <a:noFill/>
+        </p:spPr>
+        <p:txBody>
+          <a:bodyPr wrap="square" rtlCol="0">
+            <a:spAutoFit/>
+          </a:bodyPr>
+          <a:lstStyle/>
+          <a:p>
+            <a:pPr algn="ctr"/>
+            <a:r>
+              <a:rPr lang="en-US" dirty="0">
+                <a:solidFill>
+                  <a:schemeClr val="accent2">
+                    <a:lumMod val="75000"/>
+                  </a:schemeClr>
+                </a:solidFill>
+              </a:rPr>
+              <a:t>for (const </a:t>
+            </a:r>
+            <a:r>
+              <a:rPr lang="en-US" dirty="0">
+                <a:solidFill>
+                  <a:schemeClr val="accent2">
+                    <a:lumMod val="75000"/>
+                  </a:schemeClr>
+                </a:solidFill>
+                <a:highlight>
+                  <a:srgbClr val="FFFF00"/>
+                </a:highlight>
+              </a:rPr>
+              <a:t>value</a:t>
+            </a:r>
+            <a:r>
+              <a:rPr lang="en-US" dirty="0">
+                <a:solidFill>
+                  <a:schemeClr val="accent2">
+                    <a:lumMod val="75000"/>
+                  </a:schemeClr>
+                </a:solidFill>
+              </a:rPr>
+              <a:t> of </a:t>
+            </a:r>
+            <a:r>
+              <a:rPr lang="en-US" dirty="0">
+                <a:solidFill>
+                  <a:schemeClr val="accent2">
+                    <a:lumMod val="75000"/>
+                  </a:schemeClr>
+                </a:solidFill>
+                <a:highlight>
+                  <a:srgbClr val="00FF00"/>
+                </a:highlight>
+              </a:rPr>
+              <a:t>array</a:t>
+            </a:r>
+            <a:r>
+              <a:rPr lang="en-US" dirty="0">
+                <a:solidFill>
+                  <a:schemeClr val="accent2">
+                    <a:lumMod val="75000"/>
+                  </a:schemeClr>
+                </a:solidFill>
+              </a:rPr>
+              <a:t>)</a:t>
+            </a:r>
+            <a:endParaRPr lang="en-TR" dirty="0">
+              <a:solidFill>
+                <a:schemeClr val="accent2">
+                  <a:lumMod val="75000"/>
+                </a:schemeClr>
+              </a:solidFill>
+            </a:endParaRPr>
+          </a:p>
+        </p:txBody>
+      </p:sp>
+      <p:cxnSp>
+        <p:nvCxnSpPr>
+          <p:cNvPr id="35" name="Straight Arrow Connector 34">
+            <a:extLst>
+              <a:ext uri="{FF2B5EF4-FFF2-40B4-BE49-F238E27FC236}">
+                <a16:creationId xmlns:a16="http://schemas.microsoft.com/office/drawing/2014/main" id="{1151A015-E246-2349-AD87-EA4147FB35A3}"/>
+              </a:ext>
+            </a:extLst>
+          </p:cNvPr>
+          <p:cNvCxnSpPr>
+            <a:cxnSpLocks/>
+          </p:cNvCxnSpPr>
+          <p:nvPr/>
+        </p:nvCxnSpPr>
+        <p:spPr>
+          <a:xfrm flipV="1">
+            <a:off x="1166111" y="5845661"/>
+            <a:ext cx="2452956" cy="5786"/>
+          </a:xfrm>
+          <a:prstGeom prst="straightConnector1">
+            <a:avLst/>
+          </a:prstGeom>
+          <a:ln w="38100">
+            <a:solidFill>
+              <a:schemeClr val="tx2"/>
+            </a:solidFill>
+            <a:tailEnd type="triangle"/>
+          </a:ln>
+        </p:spPr>
+        <p:style>
+          <a:lnRef idx="1">
+            <a:schemeClr val="accent1"/>
+          </a:lnRef>
+          <a:fillRef idx="0">
+            <a:schemeClr val="accent1"/>
+          </a:fillRef>
+          <a:effectRef idx="0">
+            <a:schemeClr val="accent1"/>
+          </a:effectRef>
+          <a:fontRef idx="minor">
+            <a:schemeClr val="tx1"/>
+          </a:fontRef>
+        </p:style>
+      </p:cxnSp>
+      <p:sp>
+        <p:nvSpPr>
+          <p:cNvPr id="36" name="TextBox 35">
+            <a:extLst>
+              <a:ext uri="{FF2B5EF4-FFF2-40B4-BE49-F238E27FC236}">
+                <a16:creationId xmlns:a16="http://schemas.microsoft.com/office/drawing/2014/main" id="{6F2073BD-F949-284D-854D-9A91586F586A}"/>
+              </a:ext>
+            </a:extLst>
+          </p:cNvPr>
+          <p:cNvSpPr txBox="1"/>
+          <p:nvPr/>
+        </p:nvSpPr>
+        <p:spPr>
+          <a:xfrm>
+            <a:off x="1034363" y="5476329"/>
+            <a:ext cx="2621280" cy="369332"/>
+          </a:xfrm>
+          <a:prstGeom prst="rect">
+            <a:avLst/>
+          </a:prstGeom>
+          <a:noFill/>
+        </p:spPr>
+        <p:txBody>
+          <a:bodyPr wrap="square" rtlCol="0">
+            <a:spAutoFit/>
+          </a:bodyPr>
+          <a:lstStyle/>
+          <a:p>
+            <a:pPr algn="ctr"/>
+            <a:r>
+              <a:rPr lang="en-US" dirty="0">
+                <a:solidFill>
+                  <a:schemeClr val="accent2">
+                    <a:lumMod val="75000"/>
+                  </a:schemeClr>
+                </a:solidFill>
+              </a:rPr>
+              <a:t>for (const </a:t>
+            </a:r>
+            <a:r>
+              <a:rPr lang="en-US" dirty="0">
+                <a:solidFill>
+                  <a:schemeClr val="accent2">
+                    <a:lumMod val="75000"/>
+                  </a:schemeClr>
+                </a:solidFill>
+                <a:highlight>
+                  <a:srgbClr val="FFFF00"/>
+                </a:highlight>
+              </a:rPr>
+              <a:t>value</a:t>
+            </a:r>
+            <a:r>
+              <a:rPr lang="en-US" dirty="0">
+                <a:solidFill>
+                  <a:schemeClr val="accent2">
+                    <a:lumMod val="75000"/>
+                  </a:schemeClr>
+                </a:solidFill>
+              </a:rPr>
+              <a:t> of </a:t>
+            </a:r>
+            <a:r>
+              <a:rPr lang="en-US" dirty="0">
+                <a:solidFill>
+                  <a:schemeClr val="accent2">
+                    <a:lumMod val="75000"/>
+                  </a:schemeClr>
+                </a:solidFill>
+                <a:highlight>
+                  <a:srgbClr val="00FF00"/>
+                </a:highlight>
+              </a:rPr>
+              <a:t>array</a:t>
+            </a:r>
+            <a:r>
+              <a:rPr lang="en-US" dirty="0">
+                <a:solidFill>
+                  <a:schemeClr val="accent2">
+                    <a:lumMod val="75000"/>
+                  </a:schemeClr>
+                </a:solidFill>
+              </a:rPr>
+              <a:t>)</a:t>
+            </a:r>
+            <a:endParaRPr lang="en-TR" dirty="0">
+              <a:solidFill>
+                <a:schemeClr val="accent2">
+                  <a:lumMod val="75000"/>
+                </a:schemeClr>
+              </a:solidFill>
+            </a:endParaRPr>
+          </a:p>
+        </p:txBody>
+      </p:sp>
+      <p:sp>
+        <p:nvSpPr>
+          <p:cNvPr id="37" name="Rectangle 36">
+            <a:extLst>
+              <a:ext uri="{FF2B5EF4-FFF2-40B4-BE49-F238E27FC236}">
+                <a16:creationId xmlns:a16="http://schemas.microsoft.com/office/drawing/2014/main" id="{ABB4F00B-26E8-DF4F-8BD7-15931815B962}"/>
+              </a:ext>
+            </a:extLst>
+          </p:cNvPr>
+          <p:cNvSpPr/>
+          <p:nvPr/>
+        </p:nvSpPr>
+        <p:spPr>
+          <a:xfrm>
+            <a:off x="404481" y="6141720"/>
+            <a:ext cx="749808" cy="716280"/>
+          </a:xfrm>
+          <a:prstGeom prst="rect">
+            <a:avLst/>
+          </a:prstGeom>
+          <a:solidFill>
+            <a:schemeClr val="accent2"/>
+          </a:solidFill>
+        </p:spPr>
+        <p:style>
+          <a:lnRef idx="3">
+            <a:schemeClr val="lt1"/>
+          </a:lnRef>
+          <a:fillRef idx="1">
+            <a:schemeClr val="accent5"/>
+          </a:fillRef>
+          <a:effectRef idx="1">
+            <a:schemeClr val="accent5"/>
+          </a:effectRef>
+          <a:fontRef idx="minor">
+            <a:schemeClr val="lt1"/>
+          </a:fontRef>
+        </p:style>
+        <p:txBody>
+          <a:bodyPr rtlCol="0" anchor="ctr"/>
+          <a:lstStyle/>
+          <a:p>
+            <a:pPr algn="ctr"/>
+            <a:r>
+              <a:rPr lang="en-TR" dirty="0"/>
+              <a:t>10</a:t>
+            </a:r>
+          </a:p>
+        </p:txBody>
+      </p:sp>
+      <p:sp>
+        <p:nvSpPr>
+          <p:cNvPr id="39" name="Rectangle 38">
+            <a:extLst>
+              <a:ext uri="{FF2B5EF4-FFF2-40B4-BE49-F238E27FC236}">
+                <a16:creationId xmlns:a16="http://schemas.microsoft.com/office/drawing/2014/main" id="{B2968434-9283-D54E-9FAA-A83A61145B2A}"/>
+              </a:ext>
+            </a:extLst>
+          </p:cNvPr>
+          <p:cNvSpPr/>
+          <p:nvPr/>
+        </p:nvSpPr>
+        <p:spPr>
+          <a:xfrm>
+            <a:off x="7465827" y="2522318"/>
+            <a:ext cx="999744" cy="716280"/>
+          </a:xfrm>
+          <a:prstGeom prst="rect">
+            <a:avLst/>
+          </a:prstGeom>
+          <a:solidFill>
+            <a:srgbClr val="FFC000"/>
+          </a:solidFill>
+        </p:spPr>
+        <p:style>
+          <a:lnRef idx="3">
+            <a:schemeClr val="lt1"/>
+          </a:lnRef>
+          <a:fillRef idx="1">
+            <a:schemeClr val="accent4"/>
+          </a:fillRef>
+          <a:effectRef idx="1">
+            <a:schemeClr val="accent4"/>
+          </a:effectRef>
+          <a:fontRef idx="minor">
+            <a:schemeClr val="lt1"/>
+          </a:fontRef>
+        </p:style>
+        <p:txBody>
+          <a:bodyPr rtlCol="0" anchor="ctr"/>
+          <a:lstStyle/>
+          <a:p>
+            <a:pPr algn="ctr"/>
+            <a:r>
+              <a:rPr lang="en-TR" dirty="0"/>
+              <a:t>6</a:t>
+            </a:r>
+          </a:p>
+        </p:txBody>
+      </p:sp>
+      <p:sp>
+        <p:nvSpPr>
+          <p:cNvPr id="41" name="TextBox 40">
+            <a:extLst>
+              <a:ext uri="{FF2B5EF4-FFF2-40B4-BE49-F238E27FC236}">
+                <a16:creationId xmlns:a16="http://schemas.microsoft.com/office/drawing/2014/main" id="{2A5002B4-5870-9845-AEC0-7197FA9F1EDF}"/>
+              </a:ext>
+            </a:extLst>
+          </p:cNvPr>
+          <p:cNvSpPr txBox="1"/>
+          <p:nvPr/>
+        </p:nvSpPr>
+        <p:spPr>
+          <a:xfrm>
+            <a:off x="3449609" y="697936"/>
+            <a:ext cx="1748565" cy="369332"/>
+          </a:xfrm>
+          <a:prstGeom prst="rect">
+            <a:avLst/>
+          </a:prstGeom>
+          <a:noFill/>
+        </p:spPr>
+        <p:txBody>
+          <a:bodyPr wrap="square" rtlCol="0">
+            <a:spAutoFit/>
+          </a:bodyPr>
+          <a:lstStyle/>
+          <a:p>
+            <a:pPr algn="ctr"/>
+            <a:r>
+              <a:rPr lang="en-TR" dirty="0">
+                <a:solidFill>
+                  <a:schemeClr val="accent2">
+                    <a:lumMod val="75000"/>
+                  </a:schemeClr>
+                </a:solidFill>
+                <a:highlight>
+                  <a:srgbClr val="00FFFF"/>
+                </a:highlight>
+              </a:rPr>
+              <a:t>sequenceIndex</a:t>
+            </a:r>
+          </a:p>
+        </p:txBody>
+      </p:sp>
+      <p:sp>
+        <p:nvSpPr>
+          <p:cNvPr id="42" name="TextBox 41">
+            <a:extLst>
+              <a:ext uri="{FF2B5EF4-FFF2-40B4-BE49-F238E27FC236}">
+                <a16:creationId xmlns:a16="http://schemas.microsoft.com/office/drawing/2014/main" id="{A948ACED-B6E4-C245-837E-B6BCB3A5D4B5}"/>
+              </a:ext>
+            </a:extLst>
+          </p:cNvPr>
+          <p:cNvSpPr txBox="1"/>
+          <p:nvPr/>
+        </p:nvSpPr>
+        <p:spPr>
+          <a:xfrm>
+            <a:off x="3730421" y="462240"/>
+            <a:ext cx="1148071" cy="253916"/>
+          </a:xfrm>
+          <a:prstGeom prst="rect">
+            <a:avLst/>
+          </a:prstGeom>
+          <a:noFill/>
+        </p:spPr>
+        <p:txBody>
+          <a:bodyPr wrap="none" rtlCol="0">
+            <a:spAutoFit/>
+          </a:bodyPr>
+          <a:lstStyle/>
+          <a:p>
+            <a:pPr algn="ctr"/>
+            <a:r>
+              <a:rPr lang="en-US" sz="1050" dirty="0"/>
+              <a:t>(</a:t>
+            </a:r>
+            <a:r>
+              <a:rPr lang="tr-TR" sz="1050" dirty="0"/>
+              <a:t>variable created</a:t>
+            </a:r>
+            <a:r>
+              <a:rPr lang="en-TR" sz="1050" dirty="0"/>
+              <a:t>)</a:t>
+            </a:r>
+          </a:p>
+        </p:txBody>
+      </p:sp>
+      <p:sp>
+        <p:nvSpPr>
+          <p:cNvPr id="43" name="Rectangle 42">
+            <a:extLst>
+              <a:ext uri="{FF2B5EF4-FFF2-40B4-BE49-F238E27FC236}">
+                <a16:creationId xmlns:a16="http://schemas.microsoft.com/office/drawing/2014/main" id="{9328A99E-2ED9-1B43-A0B3-27AE856F9112}"/>
+              </a:ext>
+            </a:extLst>
+          </p:cNvPr>
+          <p:cNvSpPr/>
+          <p:nvPr/>
+        </p:nvSpPr>
+        <p:spPr>
+          <a:xfrm>
+            <a:off x="3813234" y="1067268"/>
+            <a:ext cx="999744" cy="716280"/>
+          </a:xfrm>
+          <a:prstGeom prst="rect">
+            <a:avLst/>
+          </a:prstGeom>
+          <a:solidFill>
+            <a:schemeClr val="accent6"/>
+          </a:solidFill>
+        </p:spPr>
+        <p:style>
+          <a:lnRef idx="3">
+            <a:schemeClr val="lt1"/>
+          </a:lnRef>
+          <a:fillRef idx="1">
+            <a:schemeClr val="accent4"/>
+          </a:fillRef>
+          <a:effectRef idx="1">
+            <a:schemeClr val="accent4"/>
+          </a:effectRef>
+          <a:fontRef idx="minor">
+            <a:schemeClr val="lt1"/>
+          </a:fontRef>
+        </p:style>
+        <p:txBody>
+          <a:bodyPr rtlCol="0" anchor="ctr"/>
+          <a:lstStyle/>
+          <a:p>
+            <a:pPr algn="ctr"/>
+            <a:r>
+              <a:rPr lang="en-TR" dirty="0"/>
+              <a:t>0</a:t>
+            </a:r>
+          </a:p>
+        </p:txBody>
+      </p:sp>
+      <p:cxnSp>
+        <p:nvCxnSpPr>
+          <p:cNvPr id="45" name="Straight Arrow Connector 44">
+            <a:extLst>
+              <a:ext uri="{FF2B5EF4-FFF2-40B4-BE49-F238E27FC236}">
+                <a16:creationId xmlns:a16="http://schemas.microsoft.com/office/drawing/2014/main" id="{3023DDA2-9DAB-C84D-A7E8-A85602D75948}"/>
+              </a:ext>
+            </a:extLst>
+          </p:cNvPr>
+          <p:cNvCxnSpPr>
+            <a:cxnSpLocks/>
+            <a:stCxn id="43" idx="3"/>
+            <a:endCxn id="20" idx="1"/>
+          </p:cNvCxnSpPr>
+          <p:nvPr/>
+        </p:nvCxnSpPr>
+        <p:spPr>
+          <a:xfrm>
+            <a:off x="4812978" y="1425408"/>
+            <a:ext cx="2652849" cy="736178"/>
+          </a:xfrm>
+          <a:prstGeom prst="straightConnector1">
+            <a:avLst/>
+          </a:prstGeom>
+          <a:ln w="38100">
+            <a:solidFill>
+              <a:schemeClr val="tx2"/>
+            </a:solidFill>
+            <a:tailEnd type="triangle"/>
+          </a:ln>
+        </p:spPr>
+        <p:style>
+          <a:lnRef idx="1">
+            <a:schemeClr val="accent1"/>
+          </a:lnRef>
+          <a:fillRef idx="0">
+            <a:schemeClr val="accent1"/>
+          </a:fillRef>
+          <a:effectRef idx="0">
+            <a:schemeClr val="accent1"/>
+          </a:effectRef>
+          <a:fontRef idx="minor">
+            <a:schemeClr val="tx1"/>
+          </a:fontRef>
+        </p:style>
+      </p:cxnSp>
+      <p:sp>
+        <p:nvSpPr>
+          <p:cNvPr id="49" name="Rectangle 48">
+            <a:extLst>
+              <a:ext uri="{FF2B5EF4-FFF2-40B4-BE49-F238E27FC236}">
+                <a16:creationId xmlns:a16="http://schemas.microsoft.com/office/drawing/2014/main" id="{60A926F8-43F0-814B-8336-68F302C0D3A5}"/>
+              </a:ext>
+            </a:extLst>
+          </p:cNvPr>
+          <p:cNvSpPr/>
+          <p:nvPr/>
+        </p:nvSpPr>
+        <p:spPr>
+          <a:xfrm>
+            <a:off x="3813234" y="1776520"/>
+            <a:ext cx="999744" cy="716280"/>
+          </a:xfrm>
+          <a:prstGeom prst="rect">
+            <a:avLst/>
+          </a:prstGeom>
+          <a:solidFill>
+            <a:schemeClr val="accent6"/>
+          </a:solidFill>
+        </p:spPr>
+        <p:style>
+          <a:lnRef idx="3">
+            <a:schemeClr val="lt1"/>
+          </a:lnRef>
+          <a:fillRef idx="1">
+            <a:schemeClr val="accent4"/>
+          </a:fillRef>
+          <a:effectRef idx="1">
+            <a:schemeClr val="accent4"/>
+          </a:effectRef>
+          <a:fontRef idx="minor">
+            <a:schemeClr val="lt1"/>
+          </a:fontRef>
+        </p:style>
+        <p:txBody>
+          <a:bodyPr rtlCol="0" anchor="ctr"/>
+          <a:lstStyle/>
+          <a:p>
+            <a:pPr algn="ctr"/>
+            <a:r>
+              <a:rPr lang="en-TR" dirty="0"/>
+              <a:t>0</a:t>
+            </a:r>
+          </a:p>
+        </p:txBody>
+      </p:sp>
+      <p:cxnSp>
+        <p:nvCxnSpPr>
+          <p:cNvPr id="50" name="Straight Arrow Connector 49">
+            <a:extLst>
+              <a:ext uri="{FF2B5EF4-FFF2-40B4-BE49-F238E27FC236}">
+                <a16:creationId xmlns:a16="http://schemas.microsoft.com/office/drawing/2014/main" id="{4DDB8B1D-4E1F-6C49-93F5-ABCBB42D82AD}"/>
+              </a:ext>
+            </a:extLst>
+          </p:cNvPr>
+          <p:cNvCxnSpPr>
+            <a:cxnSpLocks/>
+            <a:stCxn id="49" idx="3"/>
+            <a:endCxn id="20" idx="1"/>
+          </p:cNvCxnSpPr>
+          <p:nvPr/>
+        </p:nvCxnSpPr>
+        <p:spPr>
+          <a:xfrm>
+            <a:off x="4812978" y="2134660"/>
+            <a:ext cx="2652849" cy="26926"/>
+          </a:xfrm>
+          <a:prstGeom prst="straightConnector1">
+            <a:avLst/>
+          </a:prstGeom>
+          <a:ln w="38100">
+            <a:solidFill>
+              <a:schemeClr val="accent2"/>
+            </a:solidFill>
+            <a:tailEnd type="triangle"/>
+          </a:ln>
+        </p:spPr>
+        <p:style>
+          <a:lnRef idx="1">
+            <a:schemeClr val="accent1"/>
+          </a:lnRef>
+          <a:fillRef idx="0">
+            <a:schemeClr val="accent1"/>
+          </a:fillRef>
+          <a:effectRef idx="0">
+            <a:schemeClr val="accent1"/>
+          </a:effectRef>
+          <a:fontRef idx="minor">
+            <a:schemeClr val="tx1"/>
+          </a:fontRef>
+        </p:style>
+      </p:cxnSp>
+      <p:cxnSp>
+        <p:nvCxnSpPr>
+          <p:cNvPr id="52" name="Straight Arrow Connector 51">
+            <a:extLst>
+              <a:ext uri="{FF2B5EF4-FFF2-40B4-BE49-F238E27FC236}">
+                <a16:creationId xmlns:a16="http://schemas.microsoft.com/office/drawing/2014/main" id="{24FC2B7F-D02B-6142-8C50-4DEC55C36685}"/>
+              </a:ext>
+            </a:extLst>
+          </p:cNvPr>
+          <p:cNvCxnSpPr>
+            <a:cxnSpLocks/>
+          </p:cNvCxnSpPr>
+          <p:nvPr/>
+        </p:nvCxnSpPr>
+        <p:spPr>
+          <a:xfrm flipV="1">
+            <a:off x="1202687" y="2306316"/>
+            <a:ext cx="2452956" cy="5786"/>
+          </a:xfrm>
+          <a:prstGeom prst="straightConnector1">
+            <a:avLst/>
+          </a:prstGeom>
+          <a:ln w="38100">
+            <a:solidFill>
+              <a:schemeClr val="tx2"/>
+            </a:solidFill>
+            <a:tailEnd type="triangle"/>
+          </a:ln>
+        </p:spPr>
+        <p:style>
+          <a:lnRef idx="1">
+            <a:schemeClr val="accent1"/>
+          </a:lnRef>
+          <a:fillRef idx="0">
+            <a:schemeClr val="accent1"/>
+          </a:fillRef>
+          <a:effectRef idx="0">
+            <a:schemeClr val="accent1"/>
+          </a:effectRef>
+          <a:fontRef idx="minor">
+            <a:schemeClr val="tx1"/>
+          </a:fontRef>
+        </p:style>
+      </p:cxnSp>
+      <p:sp>
+        <p:nvSpPr>
+          <p:cNvPr id="53" name="TextBox 52">
+            <a:extLst>
+              <a:ext uri="{FF2B5EF4-FFF2-40B4-BE49-F238E27FC236}">
+                <a16:creationId xmlns:a16="http://schemas.microsoft.com/office/drawing/2014/main" id="{670F233E-CA19-8548-A5E6-BDDE716DB5BB}"/>
+              </a:ext>
+            </a:extLst>
+          </p:cNvPr>
+          <p:cNvSpPr txBox="1"/>
+          <p:nvPr/>
+        </p:nvSpPr>
+        <p:spPr>
+          <a:xfrm>
+            <a:off x="1034363" y="1936984"/>
+            <a:ext cx="2621280" cy="369332"/>
+          </a:xfrm>
+          <a:prstGeom prst="rect">
+            <a:avLst/>
+          </a:prstGeom>
+          <a:noFill/>
+        </p:spPr>
+        <p:txBody>
+          <a:bodyPr wrap="square" rtlCol="0">
+            <a:spAutoFit/>
+          </a:bodyPr>
+          <a:lstStyle/>
+          <a:p>
+            <a:pPr algn="ctr"/>
+            <a:r>
+              <a:rPr lang="en-US" dirty="0">
+                <a:solidFill>
+                  <a:schemeClr val="accent2">
+                    <a:lumMod val="75000"/>
+                  </a:schemeClr>
+                </a:solidFill>
+              </a:rPr>
+              <a:t>for (const </a:t>
+            </a:r>
+            <a:r>
+              <a:rPr lang="en-US" dirty="0">
+                <a:solidFill>
+                  <a:schemeClr val="accent2">
+                    <a:lumMod val="75000"/>
+                  </a:schemeClr>
+                </a:solidFill>
+                <a:highlight>
+                  <a:srgbClr val="FFFF00"/>
+                </a:highlight>
+              </a:rPr>
+              <a:t>value</a:t>
+            </a:r>
+            <a:r>
+              <a:rPr lang="en-US" dirty="0">
+                <a:solidFill>
+                  <a:schemeClr val="accent2">
+                    <a:lumMod val="75000"/>
+                  </a:schemeClr>
+                </a:solidFill>
+              </a:rPr>
+              <a:t> of </a:t>
+            </a:r>
+            <a:r>
+              <a:rPr lang="en-US" dirty="0">
+                <a:solidFill>
+                  <a:schemeClr val="accent2">
+                    <a:lumMod val="75000"/>
+                  </a:schemeClr>
+                </a:solidFill>
+                <a:highlight>
+                  <a:srgbClr val="00FF00"/>
+                </a:highlight>
+              </a:rPr>
+              <a:t>array</a:t>
+            </a:r>
+            <a:r>
+              <a:rPr lang="en-US" dirty="0">
+                <a:solidFill>
+                  <a:schemeClr val="accent2">
+                    <a:lumMod val="75000"/>
+                  </a:schemeClr>
+                </a:solidFill>
+              </a:rPr>
+              <a:t>)</a:t>
+            </a:r>
+            <a:endParaRPr lang="en-TR" dirty="0">
+              <a:solidFill>
+                <a:schemeClr val="accent2">
+                  <a:lumMod val="75000"/>
+                </a:schemeClr>
+              </a:solidFill>
+            </a:endParaRPr>
+          </a:p>
+        </p:txBody>
+      </p:sp>
+      <p:sp>
+        <p:nvSpPr>
+          <p:cNvPr id="54" name="TextBox 53">
+            <a:extLst>
+              <a:ext uri="{FF2B5EF4-FFF2-40B4-BE49-F238E27FC236}">
+                <a16:creationId xmlns:a16="http://schemas.microsoft.com/office/drawing/2014/main" id="{05563EF5-C10F-1A44-BF57-2921A525E698}"/>
+              </a:ext>
+            </a:extLst>
+          </p:cNvPr>
+          <p:cNvSpPr txBox="1"/>
+          <p:nvPr/>
+        </p:nvSpPr>
+        <p:spPr>
+          <a:xfrm>
+            <a:off x="5323631" y="839091"/>
+            <a:ext cx="1859491" cy="738664"/>
+          </a:xfrm>
+          <a:prstGeom prst="rect">
+            <a:avLst/>
+          </a:prstGeom>
+          <a:noFill/>
+          <a:ln w="12700">
+            <a:solidFill>
+              <a:schemeClr val="accent2"/>
+            </a:solidFill>
+          </a:ln>
+        </p:spPr>
+        <p:txBody>
+          <a:bodyPr wrap="square" rtlCol="0">
+            <a:spAutoFit/>
+          </a:bodyPr>
+          <a:lstStyle/>
+          <a:p>
+            <a:pPr algn="ctr"/>
+            <a:r>
+              <a:rPr lang="en-US" sz="1050" dirty="0">
+                <a:solidFill>
+                  <a:schemeClr val="accent2">
+                    <a:lumMod val="75000"/>
+                  </a:schemeClr>
+                </a:solidFill>
+                <a:latin typeface="Courier" pitchFamily="2" charset="0"/>
+              </a:rPr>
+              <a:t>If( sequence[sequenceIndex] === value ) sequenceIndex++;</a:t>
+            </a:r>
+            <a:endParaRPr lang="en-TR" sz="1050" dirty="0">
+              <a:solidFill>
+                <a:schemeClr val="accent2">
+                  <a:lumMod val="75000"/>
+                </a:schemeClr>
+              </a:solidFill>
+              <a:latin typeface="Courier" pitchFamily="2" charset="0"/>
+            </a:endParaRPr>
+          </a:p>
+        </p:txBody>
+      </p:sp>
+      <p:sp>
+        <p:nvSpPr>
+          <p:cNvPr id="55" name="Rectangle 54">
+            <a:extLst>
+              <a:ext uri="{FF2B5EF4-FFF2-40B4-BE49-F238E27FC236}">
+                <a16:creationId xmlns:a16="http://schemas.microsoft.com/office/drawing/2014/main" id="{AEBE025A-7673-BD4B-A03D-0BBA80C3A359}"/>
+              </a:ext>
+            </a:extLst>
+          </p:cNvPr>
+          <p:cNvSpPr/>
+          <p:nvPr/>
+        </p:nvSpPr>
+        <p:spPr>
+          <a:xfrm>
+            <a:off x="3813234" y="2492800"/>
+            <a:ext cx="999744" cy="716280"/>
+          </a:xfrm>
+          <a:prstGeom prst="rect">
+            <a:avLst/>
+          </a:prstGeom>
+          <a:solidFill>
+            <a:schemeClr val="accent6"/>
+          </a:solidFill>
+        </p:spPr>
+        <p:style>
+          <a:lnRef idx="3">
+            <a:schemeClr val="lt1"/>
+          </a:lnRef>
+          <a:fillRef idx="1">
+            <a:schemeClr val="accent4"/>
+          </a:fillRef>
+          <a:effectRef idx="1">
+            <a:schemeClr val="accent4"/>
+          </a:effectRef>
+          <a:fontRef idx="minor">
+            <a:schemeClr val="lt1"/>
+          </a:fontRef>
+        </p:style>
+        <p:txBody>
+          <a:bodyPr rtlCol="0" anchor="ctr"/>
+          <a:lstStyle/>
+          <a:p>
+            <a:pPr algn="ctr"/>
+            <a:r>
+              <a:rPr lang="en-TR" dirty="0"/>
+              <a:t>1</a:t>
+            </a:r>
+          </a:p>
+        </p:txBody>
+      </p:sp>
+      <p:cxnSp>
+        <p:nvCxnSpPr>
+          <p:cNvPr id="56" name="Straight Arrow Connector 55">
+            <a:extLst>
+              <a:ext uri="{FF2B5EF4-FFF2-40B4-BE49-F238E27FC236}">
+                <a16:creationId xmlns:a16="http://schemas.microsoft.com/office/drawing/2014/main" id="{7482DE67-1047-9F42-AAC1-98D856A338B4}"/>
+              </a:ext>
+            </a:extLst>
+          </p:cNvPr>
+          <p:cNvCxnSpPr>
+            <a:cxnSpLocks/>
+            <a:stCxn id="55" idx="3"/>
+            <a:endCxn id="39" idx="1"/>
+          </p:cNvCxnSpPr>
+          <p:nvPr/>
+        </p:nvCxnSpPr>
+        <p:spPr>
+          <a:xfrm>
+            <a:off x="4812978" y="2850940"/>
+            <a:ext cx="2652849" cy="29518"/>
+          </a:xfrm>
+          <a:prstGeom prst="straightConnector1">
+            <a:avLst/>
+          </a:prstGeom>
+          <a:ln w="38100">
+            <a:solidFill>
+              <a:schemeClr val="tx2"/>
+            </a:solidFill>
+            <a:tailEnd type="triangle"/>
+          </a:ln>
+        </p:spPr>
+        <p:style>
+          <a:lnRef idx="1">
+            <a:schemeClr val="accent1"/>
+          </a:lnRef>
+          <a:fillRef idx="0">
+            <a:schemeClr val="accent1"/>
+          </a:fillRef>
+          <a:effectRef idx="0">
+            <a:schemeClr val="accent1"/>
+          </a:effectRef>
+          <a:fontRef idx="minor">
+            <a:schemeClr val="tx1"/>
+          </a:fontRef>
+        </p:style>
+      </p:cxnSp>
+      <p:sp>
+        <p:nvSpPr>
+          <p:cNvPr id="58" name="Rectangle 57">
+            <a:extLst>
+              <a:ext uri="{FF2B5EF4-FFF2-40B4-BE49-F238E27FC236}">
+                <a16:creationId xmlns:a16="http://schemas.microsoft.com/office/drawing/2014/main" id="{4D5A983C-8834-9F4F-8415-367062991A3F}"/>
+              </a:ext>
+            </a:extLst>
+          </p:cNvPr>
+          <p:cNvSpPr/>
+          <p:nvPr/>
+        </p:nvSpPr>
+        <p:spPr>
+          <a:xfrm>
+            <a:off x="3813234" y="3202052"/>
+            <a:ext cx="999744" cy="716280"/>
+          </a:xfrm>
+          <a:prstGeom prst="rect">
+            <a:avLst/>
+          </a:prstGeom>
+          <a:solidFill>
+            <a:schemeClr val="accent6"/>
+          </a:solidFill>
+        </p:spPr>
+        <p:style>
+          <a:lnRef idx="3">
+            <a:schemeClr val="lt1"/>
+          </a:lnRef>
+          <a:fillRef idx="1">
+            <a:schemeClr val="accent4"/>
+          </a:fillRef>
+          <a:effectRef idx="1">
+            <a:schemeClr val="accent4"/>
+          </a:effectRef>
+          <a:fontRef idx="minor">
+            <a:schemeClr val="lt1"/>
+          </a:fontRef>
+        </p:style>
+        <p:txBody>
+          <a:bodyPr rtlCol="0" anchor="ctr"/>
+          <a:lstStyle/>
+          <a:p>
+            <a:pPr algn="ctr"/>
+            <a:r>
+              <a:rPr lang="en-TR" dirty="0"/>
+              <a:t>1</a:t>
+            </a:r>
+          </a:p>
+        </p:txBody>
+      </p:sp>
+      <p:sp>
+        <p:nvSpPr>
+          <p:cNvPr id="60" name="Rectangle 59">
+            <a:extLst>
+              <a:ext uri="{FF2B5EF4-FFF2-40B4-BE49-F238E27FC236}">
+                <a16:creationId xmlns:a16="http://schemas.microsoft.com/office/drawing/2014/main" id="{4F366669-4469-9142-819D-19CBB1F7833B}"/>
+              </a:ext>
+            </a:extLst>
+          </p:cNvPr>
+          <p:cNvSpPr/>
+          <p:nvPr/>
+        </p:nvSpPr>
+        <p:spPr>
+          <a:xfrm>
+            <a:off x="3813234" y="3911304"/>
+            <a:ext cx="999744" cy="716280"/>
+          </a:xfrm>
+          <a:prstGeom prst="rect">
+            <a:avLst/>
+          </a:prstGeom>
+          <a:solidFill>
+            <a:schemeClr val="accent6"/>
+          </a:solidFill>
+        </p:spPr>
+        <p:style>
+          <a:lnRef idx="3">
+            <a:schemeClr val="lt1"/>
+          </a:lnRef>
+          <a:fillRef idx="1">
+            <a:schemeClr val="accent4"/>
+          </a:fillRef>
+          <a:effectRef idx="1">
+            <a:schemeClr val="accent4"/>
+          </a:effectRef>
+          <a:fontRef idx="minor">
+            <a:schemeClr val="lt1"/>
+          </a:fontRef>
+        </p:style>
+        <p:txBody>
+          <a:bodyPr rtlCol="0" anchor="ctr"/>
+          <a:lstStyle/>
+          <a:p>
+            <a:pPr algn="ctr"/>
+            <a:r>
+              <a:rPr lang="en-TR" dirty="0"/>
+              <a:t>1</a:t>
+            </a:r>
+          </a:p>
+        </p:txBody>
+      </p:sp>
+      <p:cxnSp>
+        <p:nvCxnSpPr>
+          <p:cNvPr id="61" name="Straight Arrow Connector 60">
+            <a:extLst>
+              <a:ext uri="{FF2B5EF4-FFF2-40B4-BE49-F238E27FC236}">
+                <a16:creationId xmlns:a16="http://schemas.microsoft.com/office/drawing/2014/main" id="{EA74C875-8050-7645-82B1-94720E5F62F6}"/>
+              </a:ext>
+            </a:extLst>
+          </p:cNvPr>
+          <p:cNvCxnSpPr>
+            <a:cxnSpLocks/>
+            <a:stCxn id="58" idx="3"/>
+            <a:endCxn id="39" idx="1"/>
+          </p:cNvCxnSpPr>
+          <p:nvPr/>
+        </p:nvCxnSpPr>
+        <p:spPr>
+          <a:xfrm flipV="1">
+            <a:off x="4812978" y="2880458"/>
+            <a:ext cx="2652849" cy="679734"/>
+          </a:xfrm>
+          <a:prstGeom prst="straightConnector1">
+            <a:avLst/>
+          </a:prstGeom>
+          <a:ln w="38100">
+            <a:solidFill>
+              <a:schemeClr val="tx2"/>
+            </a:solidFill>
+            <a:tailEnd type="triangle"/>
+          </a:ln>
+        </p:spPr>
+        <p:style>
+          <a:lnRef idx="1">
+            <a:schemeClr val="accent1"/>
+          </a:lnRef>
+          <a:fillRef idx="0">
+            <a:schemeClr val="accent1"/>
+          </a:fillRef>
+          <a:effectRef idx="0">
+            <a:schemeClr val="accent1"/>
+          </a:effectRef>
+          <a:fontRef idx="minor">
+            <a:schemeClr val="tx1"/>
+          </a:fontRef>
+        </p:style>
+      </p:cxnSp>
+      <p:sp>
+        <p:nvSpPr>
+          <p:cNvPr id="63" name="Rectangle 62">
+            <a:extLst>
+              <a:ext uri="{FF2B5EF4-FFF2-40B4-BE49-F238E27FC236}">
+                <a16:creationId xmlns:a16="http://schemas.microsoft.com/office/drawing/2014/main" id="{2B7F95D1-EA52-1E4B-A133-109F25E908F5}"/>
+              </a:ext>
+            </a:extLst>
+          </p:cNvPr>
+          <p:cNvSpPr/>
+          <p:nvPr/>
+        </p:nvSpPr>
+        <p:spPr>
+          <a:xfrm>
+            <a:off x="3813234" y="4620556"/>
+            <a:ext cx="999744" cy="716280"/>
+          </a:xfrm>
+          <a:prstGeom prst="rect">
+            <a:avLst/>
+          </a:prstGeom>
+          <a:solidFill>
+            <a:schemeClr val="accent6"/>
+          </a:solidFill>
+        </p:spPr>
+        <p:style>
+          <a:lnRef idx="3">
+            <a:schemeClr val="lt1"/>
+          </a:lnRef>
+          <a:fillRef idx="1">
+            <a:schemeClr val="accent4"/>
+          </a:fillRef>
+          <a:effectRef idx="1">
+            <a:schemeClr val="accent4"/>
+          </a:effectRef>
+          <a:fontRef idx="minor">
+            <a:schemeClr val="lt1"/>
+          </a:fontRef>
+        </p:style>
+        <p:txBody>
+          <a:bodyPr rtlCol="0" anchor="ctr"/>
+          <a:lstStyle/>
+          <a:p>
+            <a:pPr algn="ctr"/>
+            <a:r>
+              <a:rPr lang="en-TR" dirty="0"/>
+              <a:t>2</a:t>
+            </a:r>
+          </a:p>
+        </p:txBody>
+      </p:sp>
+      <p:cxnSp>
+        <p:nvCxnSpPr>
+          <p:cNvPr id="64" name="Straight Arrow Connector 63">
+            <a:extLst>
+              <a:ext uri="{FF2B5EF4-FFF2-40B4-BE49-F238E27FC236}">
+                <a16:creationId xmlns:a16="http://schemas.microsoft.com/office/drawing/2014/main" id="{FF7562DF-E56E-0146-B1A3-C875D8CC6A5C}"/>
+              </a:ext>
+            </a:extLst>
+          </p:cNvPr>
+          <p:cNvCxnSpPr>
+            <a:cxnSpLocks/>
+            <a:endCxn id="39" idx="1"/>
+          </p:cNvCxnSpPr>
+          <p:nvPr/>
+        </p:nvCxnSpPr>
+        <p:spPr>
+          <a:xfrm flipV="1">
+            <a:off x="4812978" y="2880458"/>
+            <a:ext cx="2652849" cy="1356772"/>
+          </a:xfrm>
+          <a:prstGeom prst="straightConnector1">
+            <a:avLst/>
+          </a:prstGeom>
+          <a:ln w="38100">
+            <a:solidFill>
+              <a:schemeClr val="accent2"/>
+            </a:solidFill>
+            <a:tailEnd type="triangle"/>
+          </a:ln>
+        </p:spPr>
+        <p:style>
+          <a:lnRef idx="1">
+            <a:schemeClr val="accent1"/>
+          </a:lnRef>
+          <a:fillRef idx="0">
+            <a:schemeClr val="accent1"/>
+          </a:fillRef>
+          <a:effectRef idx="0">
+            <a:schemeClr val="accent1"/>
+          </a:effectRef>
+          <a:fontRef idx="minor">
+            <a:schemeClr val="tx1"/>
+          </a:fontRef>
+        </p:style>
+      </p:cxnSp>
+      <p:cxnSp>
+        <p:nvCxnSpPr>
+          <p:cNvPr id="66" name="Straight Arrow Connector 65">
+            <a:extLst>
+              <a:ext uri="{FF2B5EF4-FFF2-40B4-BE49-F238E27FC236}">
+                <a16:creationId xmlns:a16="http://schemas.microsoft.com/office/drawing/2014/main" id="{680E2893-1DE4-D445-8996-7E770D4B24B2}"/>
+              </a:ext>
+            </a:extLst>
+          </p:cNvPr>
+          <p:cNvCxnSpPr>
+            <a:cxnSpLocks/>
+            <a:stCxn id="63" idx="3"/>
+            <a:endCxn id="23" idx="1"/>
+          </p:cNvCxnSpPr>
+          <p:nvPr/>
+        </p:nvCxnSpPr>
+        <p:spPr>
+          <a:xfrm flipV="1">
+            <a:off x="4812978" y="3601668"/>
+            <a:ext cx="2652849" cy="1377028"/>
+          </a:xfrm>
+          <a:prstGeom prst="straightConnector1">
+            <a:avLst/>
+          </a:prstGeom>
+          <a:ln w="38100">
+            <a:solidFill>
+              <a:schemeClr val="accent2"/>
+            </a:solidFill>
+            <a:tailEnd type="triangle"/>
+          </a:ln>
+        </p:spPr>
+        <p:style>
+          <a:lnRef idx="1">
+            <a:schemeClr val="accent1"/>
+          </a:lnRef>
+          <a:fillRef idx="0">
+            <a:schemeClr val="accent1"/>
+          </a:fillRef>
+          <a:effectRef idx="0">
+            <a:schemeClr val="accent1"/>
+          </a:effectRef>
+          <a:fontRef idx="minor">
+            <a:schemeClr val="tx1"/>
+          </a:fontRef>
+        </p:style>
+      </p:cxnSp>
+      <p:sp>
+        <p:nvSpPr>
+          <p:cNvPr id="68" name="Rectangle 67">
+            <a:extLst>
+              <a:ext uri="{FF2B5EF4-FFF2-40B4-BE49-F238E27FC236}">
+                <a16:creationId xmlns:a16="http://schemas.microsoft.com/office/drawing/2014/main" id="{963D0D3E-9056-6946-A7AA-36DF78095ACA}"/>
+              </a:ext>
+            </a:extLst>
+          </p:cNvPr>
+          <p:cNvSpPr/>
+          <p:nvPr/>
+        </p:nvSpPr>
+        <p:spPr>
+          <a:xfrm>
+            <a:off x="3813234" y="5319171"/>
+            <a:ext cx="999744" cy="716280"/>
+          </a:xfrm>
+          <a:prstGeom prst="rect">
+            <a:avLst/>
+          </a:prstGeom>
+          <a:solidFill>
+            <a:schemeClr val="accent6"/>
+          </a:solidFill>
+        </p:spPr>
+        <p:style>
+          <a:lnRef idx="3">
+            <a:schemeClr val="lt1"/>
+          </a:lnRef>
+          <a:fillRef idx="1">
+            <a:schemeClr val="accent4"/>
+          </a:fillRef>
+          <a:effectRef idx="1">
+            <a:schemeClr val="accent4"/>
+          </a:effectRef>
+          <a:fontRef idx="minor">
+            <a:schemeClr val="lt1"/>
+          </a:fontRef>
+        </p:style>
+        <p:txBody>
+          <a:bodyPr rtlCol="0" anchor="ctr"/>
+          <a:lstStyle/>
+          <a:p>
+            <a:pPr algn="ctr"/>
+            <a:r>
+              <a:rPr lang="en-TR" dirty="0"/>
+              <a:t>3</a:t>
+            </a:r>
+          </a:p>
+        </p:txBody>
+      </p:sp>
+      <p:cxnSp>
+        <p:nvCxnSpPr>
+          <p:cNvPr id="69" name="Straight Arrow Connector 68">
+            <a:extLst>
+              <a:ext uri="{FF2B5EF4-FFF2-40B4-BE49-F238E27FC236}">
+                <a16:creationId xmlns:a16="http://schemas.microsoft.com/office/drawing/2014/main" id="{5425C4A6-0438-034E-8271-F3BBBA6E0BD1}"/>
+              </a:ext>
+            </a:extLst>
+          </p:cNvPr>
+          <p:cNvCxnSpPr>
+            <a:cxnSpLocks/>
+            <a:endCxn id="24" idx="1"/>
+          </p:cNvCxnSpPr>
+          <p:nvPr/>
+        </p:nvCxnSpPr>
+        <p:spPr>
+          <a:xfrm flipV="1">
+            <a:off x="4787477" y="4324894"/>
+            <a:ext cx="2678350" cy="1390644"/>
+          </a:xfrm>
+          <a:prstGeom prst="straightConnector1">
+            <a:avLst/>
+          </a:prstGeom>
+          <a:ln w="38100">
+            <a:solidFill>
+              <a:schemeClr val="tx2"/>
+            </a:solidFill>
+            <a:tailEnd type="triangle"/>
+          </a:ln>
+        </p:spPr>
+        <p:style>
+          <a:lnRef idx="1">
+            <a:schemeClr val="accent1"/>
+          </a:lnRef>
+          <a:fillRef idx="0">
+            <a:schemeClr val="accent1"/>
+          </a:fillRef>
+          <a:effectRef idx="0">
+            <a:schemeClr val="accent1"/>
+          </a:effectRef>
+          <a:fontRef idx="minor">
+            <a:schemeClr val="tx1"/>
+          </a:fontRef>
+        </p:style>
+      </p:cxnSp>
+      <p:cxnSp>
+        <p:nvCxnSpPr>
+          <p:cNvPr id="71" name="Straight Arrow Connector 70">
+            <a:extLst>
+              <a:ext uri="{FF2B5EF4-FFF2-40B4-BE49-F238E27FC236}">
+                <a16:creationId xmlns:a16="http://schemas.microsoft.com/office/drawing/2014/main" id="{08E54883-7A6B-5246-9559-18D72A3E2146}"/>
+              </a:ext>
+            </a:extLst>
+          </p:cNvPr>
+          <p:cNvCxnSpPr>
+            <a:cxnSpLocks/>
+          </p:cNvCxnSpPr>
+          <p:nvPr/>
+        </p:nvCxnSpPr>
+        <p:spPr>
+          <a:xfrm flipV="1">
+            <a:off x="1166111" y="6524122"/>
+            <a:ext cx="2452956" cy="5786"/>
+          </a:xfrm>
+          <a:prstGeom prst="straightConnector1">
+            <a:avLst/>
+          </a:prstGeom>
+          <a:ln w="38100">
+            <a:solidFill>
+              <a:schemeClr val="tx2"/>
+            </a:solidFill>
+            <a:tailEnd type="triangle"/>
+          </a:ln>
+        </p:spPr>
+        <p:style>
+          <a:lnRef idx="1">
+            <a:schemeClr val="accent1"/>
+          </a:lnRef>
+          <a:fillRef idx="0">
+            <a:schemeClr val="accent1"/>
+          </a:fillRef>
+          <a:effectRef idx="0">
+            <a:schemeClr val="accent1"/>
+          </a:effectRef>
+          <a:fontRef idx="minor">
+            <a:schemeClr val="tx1"/>
+          </a:fontRef>
+        </p:style>
+      </p:cxnSp>
+      <p:sp>
+        <p:nvSpPr>
+          <p:cNvPr id="72" name="TextBox 71">
+            <a:extLst>
+              <a:ext uri="{FF2B5EF4-FFF2-40B4-BE49-F238E27FC236}">
+                <a16:creationId xmlns:a16="http://schemas.microsoft.com/office/drawing/2014/main" id="{709992A7-6802-6C47-8E0D-D80A227DF155}"/>
+              </a:ext>
+            </a:extLst>
+          </p:cNvPr>
+          <p:cNvSpPr txBox="1"/>
+          <p:nvPr/>
+        </p:nvSpPr>
+        <p:spPr>
+          <a:xfrm>
+            <a:off x="1034363" y="6154790"/>
+            <a:ext cx="2621280" cy="369332"/>
+          </a:xfrm>
+          <a:prstGeom prst="rect">
+            <a:avLst/>
+          </a:prstGeom>
+          <a:noFill/>
+        </p:spPr>
+        <p:txBody>
+          <a:bodyPr wrap="square" rtlCol="0">
+            <a:spAutoFit/>
+          </a:bodyPr>
+          <a:lstStyle/>
+          <a:p>
+            <a:pPr algn="ctr"/>
+            <a:r>
+              <a:rPr lang="en-US" dirty="0">
+                <a:solidFill>
+                  <a:schemeClr val="accent2">
+                    <a:lumMod val="75000"/>
+                  </a:schemeClr>
+                </a:solidFill>
+              </a:rPr>
+              <a:t>for (const </a:t>
+            </a:r>
+            <a:r>
+              <a:rPr lang="en-US" dirty="0">
+                <a:solidFill>
+                  <a:schemeClr val="accent2">
+                    <a:lumMod val="75000"/>
+                  </a:schemeClr>
+                </a:solidFill>
+                <a:highlight>
+                  <a:srgbClr val="FFFF00"/>
+                </a:highlight>
+              </a:rPr>
+              <a:t>value</a:t>
+            </a:r>
+            <a:r>
+              <a:rPr lang="en-US" dirty="0">
+                <a:solidFill>
+                  <a:schemeClr val="accent2">
+                    <a:lumMod val="75000"/>
+                  </a:schemeClr>
+                </a:solidFill>
+              </a:rPr>
+              <a:t> of </a:t>
+            </a:r>
+            <a:r>
+              <a:rPr lang="en-US" dirty="0">
+                <a:solidFill>
+                  <a:schemeClr val="accent2">
+                    <a:lumMod val="75000"/>
+                  </a:schemeClr>
+                </a:solidFill>
+                <a:highlight>
+                  <a:srgbClr val="00FF00"/>
+                </a:highlight>
+              </a:rPr>
+              <a:t>array</a:t>
+            </a:r>
+            <a:r>
+              <a:rPr lang="en-US" dirty="0">
+                <a:solidFill>
+                  <a:schemeClr val="accent2">
+                    <a:lumMod val="75000"/>
+                  </a:schemeClr>
+                </a:solidFill>
+              </a:rPr>
+              <a:t>)</a:t>
+            </a:r>
+            <a:endParaRPr lang="en-TR" dirty="0">
+              <a:solidFill>
+                <a:schemeClr val="accent2">
+                  <a:lumMod val="75000"/>
+                </a:schemeClr>
+              </a:solidFill>
+            </a:endParaRPr>
+          </a:p>
+        </p:txBody>
+      </p:sp>
+      <p:sp>
+        <p:nvSpPr>
+          <p:cNvPr id="73" name="Rectangle 72">
+            <a:extLst>
+              <a:ext uri="{FF2B5EF4-FFF2-40B4-BE49-F238E27FC236}">
+                <a16:creationId xmlns:a16="http://schemas.microsoft.com/office/drawing/2014/main" id="{409E0D7A-F2FE-784B-82AB-94C69E00FD10}"/>
+              </a:ext>
+            </a:extLst>
+          </p:cNvPr>
+          <p:cNvSpPr/>
+          <p:nvPr/>
+        </p:nvSpPr>
+        <p:spPr>
+          <a:xfrm>
+            <a:off x="3813234" y="5997632"/>
+            <a:ext cx="999744" cy="716280"/>
+          </a:xfrm>
+          <a:prstGeom prst="rect">
+            <a:avLst/>
+          </a:prstGeom>
+          <a:solidFill>
+            <a:schemeClr val="accent6"/>
+          </a:solidFill>
+        </p:spPr>
+        <p:style>
+          <a:lnRef idx="3">
+            <a:schemeClr val="lt1"/>
+          </a:lnRef>
+          <a:fillRef idx="1">
+            <a:schemeClr val="accent4"/>
+          </a:fillRef>
+          <a:effectRef idx="1">
+            <a:schemeClr val="accent4"/>
+          </a:effectRef>
+          <a:fontRef idx="minor">
+            <a:schemeClr val="lt1"/>
+          </a:fontRef>
+        </p:style>
+        <p:txBody>
+          <a:bodyPr rtlCol="0" anchor="ctr"/>
+          <a:lstStyle/>
+          <a:p>
+            <a:pPr algn="ctr"/>
+            <a:r>
+              <a:rPr lang="en-TR" dirty="0"/>
+              <a:t>3</a:t>
+            </a:r>
+          </a:p>
+        </p:txBody>
+      </p:sp>
+      <p:cxnSp>
+        <p:nvCxnSpPr>
+          <p:cNvPr id="74" name="Straight Arrow Connector 73">
+            <a:extLst>
+              <a:ext uri="{FF2B5EF4-FFF2-40B4-BE49-F238E27FC236}">
+                <a16:creationId xmlns:a16="http://schemas.microsoft.com/office/drawing/2014/main" id="{A252C5DE-369E-9148-96F1-7AD51D42B593}"/>
+              </a:ext>
+            </a:extLst>
+          </p:cNvPr>
+          <p:cNvCxnSpPr>
+            <a:cxnSpLocks/>
+            <a:endCxn id="24" idx="1"/>
+          </p:cNvCxnSpPr>
+          <p:nvPr/>
+        </p:nvCxnSpPr>
+        <p:spPr>
+          <a:xfrm flipV="1">
+            <a:off x="4804747" y="4324894"/>
+            <a:ext cx="2661080" cy="2067682"/>
+          </a:xfrm>
+          <a:prstGeom prst="straightConnector1">
+            <a:avLst/>
+          </a:prstGeom>
+          <a:ln w="38100">
+            <a:solidFill>
+              <a:schemeClr val="accent2"/>
+            </a:solidFill>
+            <a:tailEnd type="triangle"/>
+          </a:ln>
+        </p:spPr>
+        <p:style>
+          <a:lnRef idx="1">
+            <a:schemeClr val="accent1"/>
+          </a:lnRef>
+          <a:fillRef idx="0">
+            <a:schemeClr val="accent1"/>
+          </a:fillRef>
+          <a:effectRef idx="0">
+            <a:schemeClr val="accent1"/>
+          </a:effectRef>
+          <a:fontRef idx="minor">
+            <a:schemeClr val="tx1"/>
+          </a:fontRef>
+        </p:style>
+      </p:cxnSp>
+      <p:sp>
+        <p:nvSpPr>
+          <p:cNvPr id="91" name="TextBox 90">
+            <a:extLst>
+              <a:ext uri="{FF2B5EF4-FFF2-40B4-BE49-F238E27FC236}">
+                <a16:creationId xmlns:a16="http://schemas.microsoft.com/office/drawing/2014/main" id="{43C7C1C5-9731-8149-8EBB-B4AA855C6B9E}"/>
+              </a:ext>
+            </a:extLst>
+          </p:cNvPr>
+          <p:cNvSpPr txBox="1"/>
+          <p:nvPr/>
+        </p:nvSpPr>
+        <p:spPr>
+          <a:xfrm>
+            <a:off x="9208226" y="2624896"/>
+            <a:ext cx="2559003" cy="1323439"/>
+          </a:xfrm>
+          <a:prstGeom prst="rect">
+            <a:avLst/>
+          </a:prstGeom>
+          <a:noFill/>
+          <a:ln w="19050">
+            <a:solidFill>
+              <a:schemeClr val="accent1"/>
+            </a:solidFill>
+          </a:ln>
+        </p:spPr>
+        <p:txBody>
+          <a:bodyPr wrap="square" rtlCol="0">
+            <a:spAutoFit/>
+          </a:bodyPr>
+          <a:lstStyle/>
+          <a:p>
+            <a:pPr algn="ctr"/>
+            <a:r>
+              <a:rPr lang="en-US" sz="1600" dirty="0">
+                <a:solidFill>
+                  <a:schemeClr val="accent2">
+                    <a:lumMod val="75000"/>
+                  </a:schemeClr>
+                </a:solidFill>
+                <a:latin typeface="Courier" pitchFamily="2" charset="0"/>
+              </a:rPr>
+              <a:t>If( sequence[sequenceIndex] === sequence.length) break;</a:t>
+            </a:r>
+            <a:endParaRPr lang="en-TR" sz="1600" dirty="0">
+              <a:solidFill>
+                <a:schemeClr val="accent2">
+                  <a:lumMod val="75000"/>
+                </a:schemeClr>
+              </a:solidFill>
+              <a:latin typeface="Courier" pitchFamily="2" charset="0"/>
+            </a:endParaRPr>
+          </a:p>
+        </p:txBody>
+      </p:sp>
+      <p:sp>
+        <p:nvSpPr>
+          <p:cNvPr id="92" name="TextBox 91">
+            <a:extLst>
+              <a:ext uri="{FF2B5EF4-FFF2-40B4-BE49-F238E27FC236}">
+                <a16:creationId xmlns:a16="http://schemas.microsoft.com/office/drawing/2014/main" id="{FA68087E-6B12-5C47-ACB4-EA84534500F6}"/>
+              </a:ext>
+            </a:extLst>
+          </p:cNvPr>
+          <p:cNvSpPr txBox="1"/>
+          <p:nvPr/>
+        </p:nvSpPr>
+        <p:spPr>
+          <a:xfrm>
+            <a:off x="9208224" y="4523316"/>
+            <a:ext cx="2559003" cy="830997"/>
+          </a:xfrm>
+          <a:prstGeom prst="rect">
+            <a:avLst/>
+          </a:prstGeom>
+          <a:noFill/>
+          <a:ln w="19050">
+            <a:solidFill>
+              <a:schemeClr val="accent1"/>
+            </a:solidFill>
+          </a:ln>
+        </p:spPr>
+        <p:txBody>
+          <a:bodyPr wrap="square" rtlCol="0">
+            <a:spAutoFit/>
+          </a:bodyPr>
+          <a:lstStyle/>
+          <a:p>
+            <a:pPr algn="ctr"/>
+            <a:r>
+              <a:rPr lang="en-US" sz="1600" dirty="0">
+                <a:solidFill>
+                  <a:schemeClr val="accent2">
+                    <a:lumMod val="75000"/>
+                  </a:schemeClr>
+                </a:solidFill>
+                <a:latin typeface="Courier" pitchFamily="2" charset="0"/>
+              </a:rPr>
+              <a:t>Return sequenceIndex === sequence.length;</a:t>
+            </a:r>
+            <a:endParaRPr lang="en-TR" sz="1600" dirty="0">
+              <a:solidFill>
+                <a:schemeClr val="accent2">
+                  <a:lumMod val="75000"/>
+                </a:schemeClr>
+              </a:solidFill>
+              <a:latin typeface="Courier" pitchFamily="2" charset="0"/>
+            </a:endParaRPr>
+          </a:p>
+        </p:txBody>
+      </p:sp>
+      <p:sp>
+        <p:nvSpPr>
+          <p:cNvPr id="93" name="TextBox 92">
+            <a:extLst>
+              <a:ext uri="{FF2B5EF4-FFF2-40B4-BE49-F238E27FC236}">
+                <a16:creationId xmlns:a16="http://schemas.microsoft.com/office/drawing/2014/main" id="{E73E84E9-2997-A043-9D9E-993F32B0549C}"/>
+              </a:ext>
+            </a:extLst>
+          </p:cNvPr>
+          <p:cNvSpPr txBox="1"/>
+          <p:nvPr/>
+        </p:nvSpPr>
+        <p:spPr>
+          <a:xfrm>
+            <a:off x="9208227" y="1209553"/>
+            <a:ext cx="2559003" cy="584775"/>
+          </a:xfrm>
+          <a:prstGeom prst="rect">
+            <a:avLst/>
+          </a:prstGeom>
+          <a:solidFill>
+            <a:srgbClr val="00B0F0"/>
+          </a:solidFill>
+          <a:ln w="19050">
+            <a:solidFill>
+              <a:schemeClr val="accent1"/>
+            </a:solidFill>
+          </a:ln>
+        </p:spPr>
+        <p:txBody>
+          <a:bodyPr wrap="square" rtlCol="0">
+            <a:spAutoFit/>
+          </a:bodyPr>
+          <a:lstStyle/>
+          <a:p>
+            <a:pPr algn="ctr"/>
+            <a:r>
+              <a:rPr lang="en-US" sz="1600" dirty="0">
+                <a:solidFill>
+                  <a:schemeClr val="bg1"/>
+                </a:solidFill>
+                <a:latin typeface="Courier" pitchFamily="2" charset="0"/>
+              </a:rPr>
+              <a:t>Reached at the end of sequence!</a:t>
+            </a:r>
+            <a:endParaRPr lang="en-TR" sz="1600" dirty="0">
+              <a:solidFill>
+                <a:schemeClr val="bg1"/>
+              </a:solidFill>
+              <a:latin typeface="Courier" pitchFamily="2" charset="0"/>
+            </a:endParaRPr>
+          </a:p>
+        </p:txBody>
+      </p:sp>
+      <p:sp>
+        <p:nvSpPr>
+          <p:cNvPr id="94" name="Down Arrow 93">
+            <a:extLst>
+              <a:ext uri="{FF2B5EF4-FFF2-40B4-BE49-F238E27FC236}">
+                <a16:creationId xmlns:a16="http://schemas.microsoft.com/office/drawing/2014/main" id="{427F8A9F-30C1-714F-899C-3390191E35F0}"/>
+              </a:ext>
+            </a:extLst>
+          </p:cNvPr>
+          <p:cNvSpPr/>
+          <p:nvPr/>
+        </p:nvSpPr>
+        <p:spPr>
+          <a:xfrm>
+            <a:off x="10315448" y="1954102"/>
+            <a:ext cx="344557" cy="524722"/>
+          </a:xfrm>
+          <a:prstGeom prst="downArrow">
+            <a:avLst/>
+          </a:prstGeom>
+        </p:spPr>
+        <p:style>
+          <a:lnRef idx="2">
+            <a:schemeClr val="accent1">
+              <a:shade val="50000"/>
+            </a:schemeClr>
+          </a:lnRef>
+          <a:fillRef idx="1">
+            <a:schemeClr val="accent1"/>
+          </a:fillRef>
+          <a:effectRef idx="0">
+            <a:schemeClr val="accent1"/>
+          </a:effectRef>
+          <a:fontRef idx="minor">
+            <a:schemeClr val="lt1"/>
+          </a:fontRef>
+        </p:style>
+        <p:txBody>
+          <a:bodyPr rtlCol="0" anchor="ctr"/>
+          <a:lstStyle/>
+          <a:p>
+            <a:pPr algn="ctr"/>
+            <a:endParaRPr lang="en-TR"/>
+          </a:p>
+        </p:txBody>
+      </p:sp>
+    </p:spTree>
+    <p:extLst>
+      <p:ext uri="{BB962C8B-B14F-4D97-AF65-F5344CB8AC3E}">
+        <p14:creationId xmlns:p14="http://schemas.microsoft.com/office/powerpoint/2010/main" val="2999089929"/>
       </p:ext>
     </p:extLst>
   </p:cSld>

</xml_diff>